<commit_message>
Updates the 08 Ohai module
</commit_message>
<xml_diff>
--- a/08-creating_ohai_plugins.pptx
+++ b/08-creating_ohai_plugins.pptx
@@ -6,10 +6,10 @@
     <p:sldMasterId id="2147483847" r:id="rId6"/>
   </p:sldMasterIdLst>
   <p:notesMasterIdLst>
-    <p:notesMasterId r:id="rId34"/>
+    <p:notesMasterId r:id="rId39"/>
   </p:notesMasterIdLst>
   <p:handoutMasterIdLst>
-    <p:handoutMasterId r:id="rId35"/>
+    <p:handoutMasterId r:id="rId40"/>
   </p:handoutMasterIdLst>
   <p:sldIdLst>
     <p:sldId id="256" r:id="rId7"/>
@@ -37,8 +37,13 @@
     <p:sldId id="283" r:id="rId29"/>
     <p:sldId id="284" r:id="rId30"/>
     <p:sldId id="289" r:id="rId31"/>
-    <p:sldId id="266" r:id="rId32"/>
-    <p:sldId id="265" r:id="rId33"/>
+    <p:sldId id="292" r:id="rId32"/>
+    <p:sldId id="295" r:id="rId33"/>
+    <p:sldId id="294" r:id="rId34"/>
+    <p:sldId id="293" r:id="rId35"/>
+    <p:sldId id="291" r:id="rId36"/>
+    <p:sldId id="266" r:id="rId37"/>
+    <p:sldId id="265" r:id="rId38"/>
   </p:sldIdLst>
   <p:sldSz cx="16256000" cy="9144000"/>
   <p:notesSz cx="6858000" cy="9144000"/>
@@ -169,7 +174,7 @@
   </p:defaultTextStyle>
   <p:extLst>
     <p:ext uri="{EFAFB233-063F-42B5-8137-9DF3F51BA10A}">
-      <p15:sldGuideLst xmlns:p15="http://schemas.microsoft.com/office/powerpoint/2012/main" xmlns="">
+      <p15:sldGuideLst xmlns="" xmlns:p15="http://schemas.microsoft.com/office/powerpoint/2012/main">
         <p15:guide id="1" orient="horz" pos="1392" userDrawn="1">
           <p15:clr>
             <a:srgbClr val="A4A3A4"/>
@@ -183,7 +188,7 @@
       </p15:sldGuideLst>
     </p:ext>
     <p:ext uri="{2D200454-40CA-4A62-9FC3-DE9A4176ACB9}">
-      <p15:notesGuideLst xmlns:p15="http://schemas.microsoft.com/office/powerpoint/2012/main" xmlns=""/>
+      <p15:notesGuideLst xmlns="" xmlns:p15="http://schemas.microsoft.com/office/powerpoint/2012/main"/>
     </p:ext>
   </p:extLst>
 </p:presentation>
@@ -300,7 +305,7 @@
               <a:pPr>
                 <a:defRPr/>
               </a:pPr>
-              <a:t>10/5/16</a:t>
+              <a:t>10/13/16</a:t>
             </a:fld>
             <a:endParaRPr lang="en-US" dirty="0"/>
           </a:p>
@@ -483,7 +488,7 @@
               <a:pPr>
                 <a:defRPr/>
               </a:pPr>
-              <a:t>10/5/16</a:t>
+              <a:t>10/13/16</a:t>
             </a:fld>
             <a:endParaRPr lang="en-US" dirty="0"/>
           </a:p>
@@ -9099,6 +9104,13 @@
   <p:transition xmlns:p14="http://schemas.microsoft.com/office/powerpoint/2010/main" spd="med">
     <p:fade/>
   </p:transition>
+  <p:timing>
+    <p:tnLst>
+      <p:par>
+        <p:cTn xmlns:p14="http://schemas.microsoft.com/office/powerpoint/2010/main" id="1" dur="indefinite" restart="never" nodeType="tmRoot"/>
+      </p:par>
+    </p:tnLst>
+  </p:timing>
 </p:sld>
 </file>
 
@@ -9131,10 +9143,16 @@
         </p:nvSpPr>
         <p:spPr/>
         <p:txBody>
-          <a:bodyPr/>
+          <a:bodyPr>
+            <a:normAutofit/>
+          </a:bodyPr>
           <a:lstStyle/>
           <a:p>
-            <a:endParaRPr lang="en-US"/>
+            <a:r>
+              <a:rPr lang="en-US" dirty="0" smtClean="0"/>
+              <a:t>Defining the Plugin that Provides Values</a:t>
+            </a:r>
+            <a:endParaRPr lang="en-US" dirty="0"/>
           </a:p>
         </p:txBody>
       </p:sp>
@@ -9224,6 +9242,13 @@
   <p:transition xmlns:p14="http://schemas.microsoft.com/office/powerpoint/2010/main" spd="med">
     <p:fade/>
   </p:transition>
+  <p:timing>
+    <p:tnLst>
+      <p:par>
+        <p:cTn xmlns:p14="http://schemas.microsoft.com/office/powerpoint/2010/main" id="1" dur="indefinite" restart="never" nodeType="tmRoot"/>
+      </p:par>
+    </p:tnLst>
+  </p:timing>
 </p:sld>
 </file>
 
@@ -9290,7 +9315,6 @@
               <a:rPr lang="en-US" b="1" dirty="0"/>
               <a:t>examples, 0 failures</a:t>
             </a:r>
-            <a:endParaRPr lang="en-US" b="1" dirty="0"/>
           </a:p>
         </p:txBody>
       </p:sp>
@@ -9357,6 +9381,13 @@
   <p:transition xmlns:p14="http://schemas.microsoft.com/office/powerpoint/2010/main" spd="med">
     <p:fade/>
   </p:transition>
+  <p:timing>
+    <p:tnLst>
+      <p:par>
+        <p:cTn xmlns:p14="http://schemas.microsoft.com/office/powerpoint/2010/main" id="1" dur="indefinite" restart="never" nodeType="tmRoot"/>
+      </p:par>
+    </p:tnLst>
+  </p:timing>
 </p:sld>
 </file>
 
@@ -9502,21 +9533,33 @@
           <a:p>
             <a:r>
               <a:rPr lang="en-US" b="1" dirty="0"/>
-              <a:t>  it 'correctly captures output' do</a:t>
-            </a:r>
-          </a:p>
-          <a:p>
-            <a:r>
-              <a:rPr lang="en-US" b="1" dirty="0"/>
-              <a:t>    </a:t>
-            </a:r>
-            <a:r>
-              <a:rPr lang="en-US" b="1" dirty="0" err="1"/>
-              <a:t>stub_plugin_shell_out</a:t>
-            </a:r>
-            <a:r>
-              <a:rPr lang="en-US" b="1" dirty="0"/>
-              <a:t>('</a:t>
+              <a:t>  it 'correctly captures output' </a:t>
+            </a:r>
+            <a:r>
+              <a:rPr lang="en-US" b="1" dirty="0" smtClean="0"/>
+              <a:t>do</a:t>
+            </a:r>
+          </a:p>
+          <a:p>
+            <a:r>
+              <a:rPr lang="en-US" b="1" dirty="0" smtClean="0"/>
+              <a:t>    allow(plugin).</a:t>
+            </a:r>
+            <a:r>
+              <a:rPr lang="en-US" b="1" dirty="0" err="1" smtClean="0"/>
+              <a:t>to_receive</a:t>
+            </a:r>
+            <a:r>
+              <a:rPr lang="en-US" b="1" dirty="0" smtClean="0"/>
+              <a:t>(:</a:t>
+            </a:r>
+            <a:r>
+              <a:rPr lang="en-US" b="1" dirty="0" err="1" smtClean="0"/>
+              <a:t>shell_out</a:t>
+            </a:r>
+            <a:r>
+              <a:rPr lang="en-US" b="1" dirty="0" smtClean="0"/>
+              <a:t>).with('</a:t>
             </a:r>
             <a:r>
               <a:rPr lang="en-US" b="1" dirty="0" err="1"/>
@@ -9524,13 +9567,30 @@
             </a:r>
             <a:r>
               <a:rPr lang="en-US" b="1" dirty="0"/>
-              <a:t> -t -D DUMP_MODULES','OUTPUT')</a:t>
-            </a:r>
-          </a:p>
-          <a:p>
-            <a:r>
-              <a:rPr lang="en-US" b="1" dirty="0"/>
-              <a:t>    expect(</a:t>
+              <a:t> -t -D DUMP_MODULES</a:t>
+            </a:r>
+            <a:r>
+              <a:rPr lang="en-US" b="1" dirty="0" smtClean="0"/>
+              <a:t>').</a:t>
+            </a:r>
+            <a:r>
+              <a:rPr lang="en-US" b="1" dirty="0" err="1" smtClean="0"/>
+              <a:t>and_return</a:t>
+            </a:r>
+            <a:r>
+              <a:rPr lang="en-US" b="1" dirty="0" smtClean="0"/>
+              <a:t>('OUTPUT')</a:t>
+            </a:r>
+            <a:endParaRPr lang="en-US" b="1" dirty="0" smtClean="0"/>
+          </a:p>
+          <a:p>
+            <a:r>
+              <a:rPr lang="en-US" b="1" dirty="0" smtClean="0"/>
+              <a:t>    expect</a:t>
+            </a:r>
+            <a:r>
+              <a:rPr lang="en-US" b="1" dirty="0"/>
+              <a:t>(</a:t>
             </a:r>
             <a:r>
               <a:rPr lang="en-US" b="1" dirty="0" err="1"/>
@@ -9545,9 +9605,10 @@
               <a:t>eq</a:t>
             </a:r>
             <a:r>
-              <a:rPr lang="en-US" b="1" dirty="0"/>
+              <a:rPr lang="en-US" b="1" dirty="0" smtClean="0"/>
               <a:t>("OUTPUT")</a:t>
             </a:r>
+            <a:endParaRPr lang="en-US" b="1" dirty="0"/>
           </a:p>
           <a:p>
             <a:r>
@@ -9639,6 +9700,13 @@
   <p:transition xmlns:p14="http://schemas.microsoft.com/office/powerpoint/2010/main" spd="med">
     <p:fade/>
   </p:transition>
+  <p:timing>
+    <p:tnLst>
+      <p:par>
+        <p:cTn xmlns:p14="http://schemas.microsoft.com/office/powerpoint/2010/main" id="1" dur="indefinite" restart="never" nodeType="tmRoot"/>
+      </p:par>
+    </p:tnLst>
+  </p:timing>
 </p:sld>
 </file>
 
@@ -9844,6 +9912,13 @@
   <p:transition xmlns:p14="http://schemas.microsoft.com/office/powerpoint/2010/main" spd="med">
     <p:fade/>
   </p:transition>
+  <p:timing>
+    <p:tnLst>
+      <p:par>
+        <p:cTn xmlns:p14="http://schemas.microsoft.com/office/powerpoint/2010/main" id="1" dur="indefinite" restart="never" nodeType="tmRoot"/>
+      </p:par>
+    </p:tnLst>
+  </p:timing>
 </p:sld>
 </file>
 
@@ -10075,6 +10150,13 @@
   <p:transition xmlns:p14="http://schemas.microsoft.com/office/powerpoint/2010/main" spd="med">
     <p:fade/>
   </p:transition>
+  <p:timing>
+    <p:tnLst>
+      <p:par>
+        <p:cTn xmlns:p14="http://schemas.microsoft.com/office/powerpoint/2010/main" id="1" dur="indefinite" restart="never" nodeType="tmRoot"/>
+      </p:par>
+    </p:tnLst>
+  </p:timing>
 </p:sld>
 </file>
 
@@ -10155,7 +10237,6 @@
               <a:rPr lang="en-US" b="1" dirty="0"/>
               <a:t>examples, 0 failures</a:t>
             </a:r>
-            <a:endParaRPr lang="en-US" b="1" dirty="0"/>
           </a:p>
         </p:txBody>
       </p:sp>
@@ -10222,6 +10303,13 @@
   <p:transition xmlns:p14="http://schemas.microsoft.com/office/powerpoint/2010/main" spd="med">
     <p:fade/>
   </p:transition>
+  <p:timing>
+    <p:tnLst>
+      <p:par>
+        <p:cTn xmlns:p14="http://schemas.microsoft.com/office/powerpoint/2010/main" id="1" dur="indefinite" restart="never" nodeType="tmRoot"/>
+      </p:par>
+    </p:tnLst>
+  </p:timing>
 </p:sld>
 </file>
 
@@ -10384,6 +10472,21 @@
               <a:t> plugin</a:t>
             </a:r>
           </a:p>
+          <a:p>
+            <a:pPr marL="342900" indent="-342900">
+              <a:buFont typeface="Wingdings" charset="2"/>
+              <a:buChar char="q"/>
+            </a:pPr>
+            <a:r>
+              <a:rPr lang="en-US" dirty="0"/>
+              <a:t>Define an integration </a:t>
+            </a:r>
+            <a:r>
+              <a:rPr lang="en-US" dirty="0" smtClean="0"/>
+              <a:t>test</a:t>
+            </a:r>
+            <a:endParaRPr lang="en-US" dirty="0"/>
+          </a:p>
         </p:txBody>
       </p:sp>
     </p:spTree>
@@ -10399,6 +10502,13 @@
   <p:transition xmlns:p14="http://schemas.microsoft.com/office/powerpoint/2010/main" spd="med">
     <p:fade/>
   </p:transition>
+  <p:timing>
+    <p:tnLst>
+      <p:par>
+        <p:cTn xmlns:p14="http://schemas.microsoft.com/office/powerpoint/2010/main" id="1" dur="indefinite" restart="never" nodeType="tmRoot"/>
+      </p:par>
+    </p:tnLst>
+  </p:timing>
 </p:sld>
 </file>
 
@@ -10787,6 +10897,13 @@
   <p:transition xmlns:p14="http://schemas.microsoft.com/office/powerpoint/2010/main" spd="med">
     <p:fade/>
   </p:transition>
+  <p:timing>
+    <p:tnLst>
+      <p:par>
+        <p:cTn xmlns:p14="http://schemas.microsoft.com/office/powerpoint/2010/main" id="1" dur="indefinite" restart="never" nodeType="tmRoot"/>
+      </p:par>
+    </p:tnLst>
+  </p:timing>
 </p:sld>
 </file>
 
@@ -11034,6 +11151,13 @@
   <p:transition xmlns:p14="http://schemas.microsoft.com/office/powerpoint/2010/main" spd="med">
     <p:fade/>
   </p:transition>
+  <p:timing>
+    <p:tnLst>
+      <p:par>
+        <p:cTn xmlns:p14="http://schemas.microsoft.com/office/powerpoint/2010/main" id="1" dur="indefinite" restart="never" nodeType="tmRoot"/>
+      </p:par>
+    </p:tnLst>
+  </p:timing>
 </p:sld>
 </file>
 
@@ -11468,6 +11592,13 @@
   <p:transition xmlns:p14="http://schemas.microsoft.com/office/powerpoint/2010/main" spd="med">
     <p:fade/>
   </p:transition>
+  <p:timing>
+    <p:tnLst>
+      <p:par>
+        <p:cTn xmlns:p14="http://schemas.microsoft.com/office/powerpoint/2010/main" id="1" dur="indefinite" restart="never" nodeType="tmRoot"/>
+      </p:par>
+    </p:tnLst>
+  </p:timing>
 </p:sld>
 </file>
 
@@ -11612,7 +11743,6 @@
               <a:rPr lang="en-US" b="1" dirty="0"/>
               <a:t> resources:</a:t>
             </a:r>
-            <a:endParaRPr lang="en-US" b="1" dirty="0"/>
           </a:p>
         </p:txBody>
       </p:sp>
@@ -11679,6 +11809,13 @@
   <p:transition xmlns:p14="http://schemas.microsoft.com/office/powerpoint/2010/main" spd="med">
     <p:fade/>
   </p:transition>
+  <p:timing>
+    <p:tnLst>
+      <p:par>
+        <p:cTn xmlns:p14="http://schemas.microsoft.com/office/powerpoint/2010/main" id="1" dur="indefinite" restart="never" nodeType="tmRoot"/>
+      </p:par>
+    </p:tnLst>
+  </p:timing>
 </p:sld>
 </file>
 
@@ -11841,6 +11978,21 @@
               <a:t> plugin</a:t>
             </a:r>
           </a:p>
+          <a:p>
+            <a:pPr marL="342900" indent="-342900">
+              <a:buFont typeface="Wingdings" charset="2"/>
+              <a:buChar char="q"/>
+            </a:pPr>
+            <a:r>
+              <a:rPr lang="en-US" dirty="0"/>
+              <a:t>Define an integration </a:t>
+            </a:r>
+            <a:r>
+              <a:rPr lang="en-US" dirty="0" smtClean="0"/>
+              <a:t>test</a:t>
+            </a:r>
+            <a:endParaRPr lang="en-US" dirty="0"/>
+          </a:p>
         </p:txBody>
       </p:sp>
     </p:spTree>
@@ -11856,6 +12008,13 @@
   <p:transition xmlns:p14="http://schemas.microsoft.com/office/powerpoint/2010/main" spd="med">
     <p:fade/>
   </p:transition>
+  <p:timing>
+    <p:tnLst>
+      <p:par>
+        <p:cTn xmlns:p14="http://schemas.microsoft.com/office/powerpoint/2010/main" id="1" dur="indefinite" restart="never" nodeType="tmRoot"/>
+      </p:par>
+    </p:tnLst>
+  </p:timing>
 </p:sld>
 </file>
 
@@ -11978,7 +12137,6 @@
               <a:rPr lang="en-US" b="1" dirty="0"/>
               <a:t>'</a:t>
             </a:r>
-            <a:endParaRPr lang="en-US" b="1" dirty="0"/>
           </a:p>
         </p:txBody>
       </p:sp>
@@ -12054,6 +12212,13 @@
   <p:transition xmlns:p14="http://schemas.microsoft.com/office/powerpoint/2010/main" spd="med">
     <p:fade/>
   </p:transition>
+  <p:timing>
+    <p:tnLst>
+      <p:par>
+        <p:cTn xmlns:p14="http://schemas.microsoft.com/office/powerpoint/2010/main" id="1" dur="indefinite" restart="never" nodeType="tmRoot"/>
+      </p:par>
+    </p:tnLst>
+  </p:timing>
 </p:sld>
 </file>
 
@@ -12108,7 +12273,6 @@
               <a:rPr lang="en-US" b="1" dirty="0"/>
               <a:t>12 examples, 0 failures</a:t>
             </a:r>
-            <a:endParaRPr lang="en-US" b="1" dirty="0"/>
           </a:p>
         </p:txBody>
       </p:sp>
@@ -12175,6 +12339,13 @@
   <p:transition xmlns:p14="http://schemas.microsoft.com/office/powerpoint/2010/main" spd="med">
     <p:fade/>
   </p:transition>
+  <p:timing>
+    <p:tnLst>
+      <p:par>
+        <p:cTn xmlns:p14="http://schemas.microsoft.com/office/powerpoint/2010/main" id="1" dur="indefinite" restart="never" nodeType="tmRoot"/>
+      </p:par>
+    </p:tnLst>
+  </p:timing>
 </p:sld>
 </file>
 
@@ -12337,6 +12508,23 @@
               <a:t> plugin</a:t>
             </a:r>
           </a:p>
+          <a:p>
+            <a:pPr marL="342900" indent="-342900">
+              <a:buFont typeface="Wingdings" charset="2"/>
+              <a:buChar char="q"/>
+            </a:pPr>
+            <a:r>
+              <a:rPr lang="en-US" dirty="0"/>
+              <a:t>Define an integration test</a:t>
+            </a:r>
+          </a:p>
+          <a:p>
+            <a:pPr marL="342900" indent="-342900">
+              <a:buFont typeface="Wingdings" charset="2"/>
+              <a:buChar char="ü"/>
+            </a:pPr>
+            <a:endParaRPr lang="en-US" dirty="0" smtClean="0"/>
+          </a:p>
         </p:txBody>
       </p:sp>
     </p:spTree>
@@ -12352,6 +12540,13 @@
   <p:transition xmlns:p14="http://schemas.microsoft.com/office/powerpoint/2010/main" spd="med">
     <p:fade/>
   </p:transition>
+  <p:timing>
+    <p:tnLst>
+      <p:par>
+        <p:cTn xmlns:p14="http://schemas.microsoft.com/office/powerpoint/2010/main" id="1" dur="indefinite" restart="never" nodeType="tmRoot"/>
+      </p:par>
+    </p:tnLst>
+  </p:timing>
 </p:sld>
 </file>
 
@@ -12379,32 +12574,7 @@
             <a:spLocks noGrp="1"/>
           </p:cNvSpPr>
           <p:nvPr>
-            <p:ph type="ctrTitle"/>
-          </p:nvPr>
-        </p:nvSpPr>
-        <p:spPr/>
-        <p:txBody>
-          <a:bodyPr>
-            <a:normAutofit fontScale="90000"/>
-          </a:bodyPr>
-          <a:lstStyle/>
-          <a:p>
-            <a:r>
-              <a:rPr lang="en-US" dirty="0" smtClean="0"/>
-              <a:t>Q&amp;A</a:t>
-            </a:r>
-            <a:endParaRPr lang="en-US" dirty="0"/>
-          </a:p>
-        </p:txBody>
-      </p:sp>
-      <p:sp>
-        <p:nvSpPr>
-          <p:cNvPr id="3" name="Subtitle 2"/>
-          <p:cNvSpPr>
-            <a:spLocks noGrp="1"/>
-          </p:cNvSpPr>
-          <p:nvPr>
-            <p:ph type="subTitle" idx="1"/>
+            <p:ph type="title"/>
           </p:nvPr>
         </p:nvSpPr>
         <p:spPr/>
@@ -12414,8 +12584,211 @@
           <a:p>
             <a:r>
               <a:rPr lang="en-US" dirty="0" smtClean="0"/>
-              <a:t>What questions can we answer for you?</a:t>
-            </a:r>
+              <a:t>Appending the New Recipe to the Suite</a:t>
+            </a:r>
+            <a:endParaRPr lang="en-US" dirty="0"/>
+          </a:p>
+        </p:txBody>
+      </p:sp>
+      <p:sp>
+        <p:nvSpPr>
+          <p:cNvPr id="3" name="Content Placeholder 2"/>
+          <p:cNvSpPr>
+            <a:spLocks noGrp="1"/>
+          </p:cNvSpPr>
+          <p:nvPr>
+            <p:ph sz="quarter" idx="10"/>
+          </p:nvPr>
+        </p:nvSpPr>
+        <p:spPr/>
+        <p:txBody>
+          <a:bodyPr/>
+          <a:lstStyle/>
+          <a:p>
+            <a:r>
+              <a:rPr lang="en-US" b="1" dirty="0" smtClean="0"/>
+              <a:t># ... TOP OF KITCHEN CONFIGURATION ...</a:t>
+            </a:r>
+          </a:p>
+          <a:p>
+            <a:r>
+              <a:rPr lang="en-US" b="1" dirty="0" smtClean="0"/>
+              <a:t>suites:</a:t>
+            </a:r>
+          </a:p>
+          <a:p>
+            <a:r>
+              <a:rPr lang="en-US" b="1" dirty="0" smtClean="0"/>
+              <a:t>  - name: default</a:t>
+            </a:r>
+          </a:p>
+          <a:p>
+            <a:r>
+              <a:rPr lang="en-US" b="1" dirty="0"/>
+              <a:t> </a:t>
+            </a:r>
+            <a:r>
+              <a:rPr lang="en-US" b="1" dirty="0" smtClean="0"/>
+              <a:t>   </a:t>
+            </a:r>
+            <a:r>
+              <a:rPr lang="en-US" b="1" dirty="0" err="1" smtClean="0"/>
+              <a:t>run_list</a:t>
+            </a:r>
+            <a:r>
+              <a:rPr lang="en-US" b="1" dirty="0" smtClean="0"/>
+              <a:t>:</a:t>
+            </a:r>
+          </a:p>
+          <a:p>
+            <a:r>
+              <a:rPr lang="en-US" b="1" dirty="0"/>
+              <a:t> </a:t>
+            </a:r>
+            <a:r>
+              <a:rPr lang="en-US" b="1" dirty="0" smtClean="0"/>
+              <a:t>     - recipe[</a:t>
+            </a:r>
+            <a:r>
+              <a:rPr lang="en-US" b="1" dirty="0" err="1" smtClean="0"/>
+              <a:t>httpd</a:t>
+            </a:r>
+            <a:r>
+              <a:rPr lang="en-US" b="1" dirty="0" smtClean="0"/>
+              <a:t>::default]</a:t>
+            </a:r>
+          </a:p>
+          <a:p>
+            <a:r>
+              <a:rPr lang="en-US" b="1" dirty="0"/>
+              <a:t> </a:t>
+            </a:r>
+            <a:r>
+              <a:rPr lang="en-US" b="1" dirty="0" smtClean="0"/>
+              <a:t>     - recipe[</a:t>
+            </a:r>
+            <a:r>
+              <a:rPr lang="en-US" b="1" dirty="0" err="1" smtClean="0"/>
+              <a:t>httpd</a:t>
+            </a:r>
+            <a:r>
+              <a:rPr lang="en-US" b="1" dirty="0" smtClean="0"/>
+              <a:t>::</a:t>
+            </a:r>
+            <a:r>
+              <a:rPr lang="en-US" b="1" dirty="0" err="1" smtClean="0"/>
+              <a:t>ohai_httpd_modules</a:t>
+            </a:r>
+            <a:r>
+              <a:rPr lang="en-US" b="1" dirty="0" smtClean="0"/>
+              <a:t>]</a:t>
+            </a:r>
+          </a:p>
+          <a:p>
+            <a:r>
+              <a:rPr lang="en-US" b="1" dirty="0"/>
+              <a:t> </a:t>
+            </a:r>
+            <a:r>
+              <a:rPr lang="en-US" b="1" dirty="0" smtClean="0"/>
+              <a:t>   verifier:</a:t>
+            </a:r>
+          </a:p>
+          <a:p>
+            <a:r>
+              <a:rPr lang="en-US" b="1" dirty="0"/>
+              <a:t> </a:t>
+            </a:r>
+            <a:r>
+              <a:rPr lang="en-US" b="1" dirty="0" smtClean="0"/>
+              <a:t>     </a:t>
+            </a:r>
+            <a:r>
+              <a:rPr lang="en-US" b="1" dirty="0" err="1" smtClean="0"/>
+              <a:t>inspec_tests</a:t>
+            </a:r>
+            <a:r>
+              <a:rPr lang="en-US" b="1" dirty="0" smtClean="0"/>
+              <a:t>:</a:t>
+            </a:r>
+          </a:p>
+          <a:p>
+            <a:r>
+              <a:rPr lang="en-US" b="1" dirty="0"/>
+              <a:t> </a:t>
+            </a:r>
+            <a:r>
+              <a:rPr lang="en-US" b="1" dirty="0" smtClean="0"/>
+              <a:t>       - test/recipes</a:t>
+            </a:r>
+          </a:p>
+          <a:p>
+            <a:r>
+              <a:rPr lang="en-US" b="1" dirty="0"/>
+              <a:t> </a:t>
+            </a:r>
+            <a:r>
+              <a:rPr lang="en-US" b="1" dirty="0" smtClean="0"/>
+              <a:t>   attributes:</a:t>
+            </a:r>
+          </a:p>
+        </p:txBody>
+      </p:sp>
+      <p:sp>
+        <p:nvSpPr>
+          <p:cNvPr id="4" name="Text Placeholder 3"/>
+          <p:cNvSpPr>
+            <a:spLocks noGrp="1"/>
+          </p:cNvSpPr>
+          <p:nvPr>
+            <p:ph type="body" sz="quarter" idx="11"/>
+          </p:nvPr>
+        </p:nvSpPr>
+        <p:spPr/>
+        <p:txBody>
+          <a:bodyPr/>
+          <a:lstStyle/>
+          <a:p>
+            <a:r>
+              <a:rPr lang="en-US" dirty="0" smtClean="0"/>
+              <a:t>~/</a:t>
+            </a:r>
+            <a:r>
+              <a:rPr lang="en-US" dirty="0" err="1" smtClean="0"/>
+              <a:t>httpd</a:t>
+            </a:r>
+            <a:r>
+              <a:rPr lang="en-US" dirty="0" smtClean="0"/>
+              <a:t>/.</a:t>
+            </a:r>
+            <a:r>
+              <a:rPr lang="en-US" dirty="0" err="1" smtClean="0"/>
+              <a:t>kitchen.yml</a:t>
+            </a:r>
+            <a:endParaRPr lang="en-US" dirty="0"/>
+          </a:p>
+        </p:txBody>
+      </p:sp>
+      <p:sp>
+        <p:nvSpPr>
+          <p:cNvPr id="6" name="Text Placeholder 5"/>
+          <p:cNvSpPr>
+            <a:spLocks noGrp="1"/>
+          </p:cNvSpPr>
+          <p:nvPr>
+            <p:ph type="body" sz="quarter" idx="13"/>
+          </p:nvPr>
+        </p:nvSpPr>
+        <p:spPr>
+          <a:xfrm>
+            <a:off x="1135042" y="4736151"/>
+            <a:ext cx="14404273" cy="624310"/>
+          </a:xfrm>
+        </p:spPr>
+        <p:txBody>
+          <a:bodyPr/>
+          <a:lstStyle/>
+          <a:p>
             <a:endParaRPr lang="en-US" dirty="0"/>
           </a:p>
         </p:txBody>
@@ -12423,7 +12796,7 @@
     </p:spTree>
     <p:extLst>
       <p:ext uri="{BB962C8B-B14F-4D97-AF65-F5344CB8AC3E}">
-        <p14:creationId xmlns:p14="http://schemas.microsoft.com/office/powerpoint/2010/main" val="941952846"/>
+        <p14:creationId xmlns:p14="http://schemas.microsoft.com/office/powerpoint/2010/main" val="970036524"/>
       </p:ext>
     </p:extLst>
   </p:cSld>
@@ -12460,10 +12833,225 @@
           <a:chExt cx="0" cy="0"/>
         </a:xfrm>
       </p:grpSpPr>
+      <p:sp>
+        <p:nvSpPr>
+          <p:cNvPr id="2" name="Content Placeholder 1"/>
+          <p:cNvSpPr>
+            <a:spLocks noGrp="1"/>
+          </p:cNvSpPr>
+          <p:nvPr>
+            <p:ph sz="quarter" idx="10"/>
+          </p:nvPr>
+        </p:nvSpPr>
+        <p:spPr/>
+        <p:txBody>
+          <a:bodyPr/>
+          <a:lstStyle/>
+          <a:p>
+            <a:r>
+              <a:rPr lang="en-US" b="1" dirty="0"/>
+              <a:t>-----&gt; Starting Kitchen (v1.11.1)</a:t>
+            </a:r>
+          </a:p>
+          <a:p>
+            <a:r>
+              <a:rPr lang="en-US" b="1" dirty="0"/>
+              <a:t>-----&gt; Converging &lt;default-centos-67&gt;..</a:t>
+            </a:r>
+            <a:r>
+              <a:rPr lang="en-US" b="1" dirty="0" smtClean="0"/>
+              <a:t>.</a:t>
+            </a:r>
+          </a:p>
+          <a:p>
+            <a:r>
+              <a:rPr lang="en-US" b="1" dirty="0" smtClean="0"/>
+              <a:t>       resolving </a:t>
+            </a:r>
+            <a:r>
+              <a:rPr lang="en-US" b="1" dirty="0"/>
+              <a:t>cookbooks for run list: ["</a:t>
+            </a:r>
+            <a:r>
+              <a:rPr lang="en-US" b="1" dirty="0" err="1"/>
+              <a:t>httpd</a:t>
+            </a:r>
+            <a:r>
+              <a:rPr lang="en-US" b="1" dirty="0"/>
+              <a:t>::default", "</a:t>
+            </a:r>
+            <a:r>
+              <a:rPr lang="en-US" b="1" dirty="0" err="1"/>
+              <a:t>httpd</a:t>
+            </a:r>
+            <a:r>
+              <a:rPr lang="en-US" b="1" dirty="0"/>
+              <a:t>::</a:t>
+            </a:r>
+            <a:r>
+              <a:rPr lang="en-US" b="1" dirty="0" err="1"/>
+              <a:t>ohai_httpd_modules</a:t>
+            </a:r>
+            <a:r>
+              <a:rPr lang="en-US" b="1" dirty="0"/>
+              <a:t>"]</a:t>
+            </a:r>
+          </a:p>
+          <a:p>
+            <a:r>
+              <a:rPr lang="en-US" b="1" dirty="0"/>
+              <a:t>       Synchronizing Cookbooks:</a:t>
+            </a:r>
+          </a:p>
+          <a:p>
+            <a:r>
+              <a:rPr lang="en-US" b="1" dirty="0"/>
+              <a:t>         - </a:t>
+            </a:r>
+            <a:r>
+              <a:rPr lang="en-US" b="1" dirty="0" err="1"/>
+              <a:t>ohai</a:t>
+            </a:r>
+            <a:r>
+              <a:rPr lang="en-US" b="1" dirty="0"/>
+              <a:t> (4.2.2)</a:t>
+            </a:r>
+          </a:p>
+          <a:p>
+            <a:r>
+              <a:rPr lang="en-US" b="1" dirty="0"/>
+              <a:t>         - </a:t>
+            </a:r>
+            <a:r>
+              <a:rPr lang="en-US" b="1" dirty="0" err="1"/>
+              <a:t>httpd</a:t>
+            </a:r>
+            <a:r>
+              <a:rPr lang="en-US" b="1" dirty="0"/>
+              <a:t> (0.1.0)</a:t>
+            </a:r>
+          </a:p>
+          <a:p>
+            <a:r>
+              <a:rPr lang="en-US" b="1" dirty="0"/>
+              <a:t>         - </a:t>
+            </a:r>
+            <a:r>
+              <a:rPr lang="en-US" b="1" dirty="0" err="1"/>
+              <a:t>compat_resource</a:t>
+            </a:r>
+            <a:r>
+              <a:rPr lang="en-US" b="1" dirty="0"/>
+              <a:t> (12.14.7)</a:t>
+            </a:r>
+          </a:p>
+          <a:p>
+            <a:r>
+              <a:rPr lang="en-US" b="1" dirty="0"/>
+              <a:t>       Installing Cookbook Gems:</a:t>
+            </a:r>
+          </a:p>
+          <a:p>
+            <a:r>
+              <a:rPr lang="en-US" b="1" dirty="0"/>
+              <a:t>       Compiling Cookbooks...</a:t>
+            </a:r>
+          </a:p>
+          <a:p>
+            <a:r>
+              <a:rPr lang="en-US" b="1" dirty="0"/>
+              <a:t>       Recipe: </a:t>
+            </a:r>
+            <a:r>
+              <a:rPr lang="en-US" b="1" dirty="0" err="1"/>
+              <a:t>httpd</a:t>
+            </a:r>
+            <a:r>
+              <a:rPr lang="en-US" b="1" dirty="0"/>
+              <a:t>::</a:t>
+            </a:r>
+            <a:r>
+              <a:rPr lang="en-US" b="1" dirty="0" err="1"/>
+              <a:t>ohai_httpd_modules</a:t>
+            </a:r>
+            <a:endParaRPr lang="en-US" b="1" dirty="0"/>
+          </a:p>
+        </p:txBody>
+      </p:sp>
+      <p:sp>
+        <p:nvSpPr>
+          <p:cNvPr id="3" name="Text Placeholder 2"/>
+          <p:cNvSpPr>
+            <a:spLocks noGrp="1"/>
+          </p:cNvSpPr>
+          <p:nvPr>
+            <p:ph type="body" sz="quarter" idx="11"/>
+          </p:nvPr>
+        </p:nvSpPr>
+        <p:spPr/>
+        <p:txBody>
+          <a:bodyPr/>
+          <a:lstStyle/>
+          <a:p>
+            <a:r>
+              <a:rPr lang="en-US" dirty="0" smtClean="0"/>
+              <a:t>&gt; kitchen converge</a:t>
+            </a:r>
+            <a:endParaRPr lang="en-US" dirty="0"/>
+          </a:p>
+        </p:txBody>
+      </p:sp>
+      <p:sp>
+        <p:nvSpPr>
+          <p:cNvPr id="4" name="Content Placeholder 3"/>
+          <p:cNvSpPr>
+            <a:spLocks noGrp="1"/>
+          </p:cNvSpPr>
+          <p:nvPr>
+            <p:ph sz="quarter" idx="12"/>
+          </p:nvPr>
+        </p:nvSpPr>
+        <p:spPr>
+          <a:xfrm>
+            <a:off x="1127883" y="3336155"/>
+            <a:ext cx="14420850" cy="1141660"/>
+          </a:xfrm>
+        </p:spPr>
+        <p:txBody>
+          <a:bodyPr/>
+          <a:lstStyle/>
+          <a:p>
+            <a:endParaRPr lang="en-US" dirty="0"/>
+          </a:p>
+        </p:txBody>
+      </p:sp>
+      <p:sp>
+        <p:nvSpPr>
+          <p:cNvPr id="5" name="Title 4"/>
+          <p:cNvSpPr>
+            <a:spLocks noGrp="1"/>
+          </p:cNvSpPr>
+          <p:nvPr>
+            <p:ph type="title"/>
+          </p:nvPr>
+        </p:nvSpPr>
+        <p:spPr/>
+        <p:txBody>
+          <a:bodyPr/>
+          <a:lstStyle/>
+          <a:p>
+            <a:r>
+              <a:rPr lang="en-US" dirty="0" smtClean="0"/>
+              <a:t>Converging the Updated Default Suite</a:t>
+            </a:r>
+            <a:endParaRPr lang="en-US" dirty="0"/>
+          </a:p>
+        </p:txBody>
+      </p:sp>
     </p:spTree>
     <p:extLst>
       <p:ext uri="{BB962C8B-B14F-4D97-AF65-F5344CB8AC3E}">
-        <p14:creationId xmlns:p14="http://schemas.microsoft.com/office/powerpoint/2010/main" val="4132643939"/>
+        <p14:creationId xmlns:p14="http://schemas.microsoft.com/office/powerpoint/2010/main" val="3734536480"/>
       </p:ext>
     </p:extLst>
   </p:cSld>
@@ -12473,6 +13061,454 @@
   <p:transition xmlns:p14="http://schemas.microsoft.com/office/powerpoint/2010/main" spd="med">
     <p:fade/>
   </p:transition>
+  <p:timing>
+    <p:tnLst>
+      <p:par>
+        <p:cTn xmlns:p14="http://schemas.microsoft.com/office/powerpoint/2010/main" id="1" dur="indefinite" restart="never" nodeType="tmRoot"/>
+      </p:par>
+    </p:tnLst>
+  </p:timing>
+</p:sld>
+</file>
+
+<file path=ppt/slides/slide28.xml><?xml version="1.0" encoding="utf-8"?>
+<p:sld xmlns:a="http://schemas.openxmlformats.org/drawingml/2006/main" xmlns:r="http://schemas.openxmlformats.org/officeDocument/2006/relationships" xmlns:p="http://schemas.openxmlformats.org/presentationml/2006/main">
+  <p:cSld>
+    <p:spTree>
+      <p:nvGrpSpPr>
+        <p:cNvPr id="1" name=""/>
+        <p:cNvGrpSpPr/>
+        <p:nvPr/>
+      </p:nvGrpSpPr>
+      <p:grpSpPr>
+        <a:xfrm>
+          <a:off x="0" y="0"/>
+          <a:ext cx="0" cy="0"/>
+          <a:chOff x="0" y="0"/>
+          <a:chExt cx="0" cy="0"/>
+        </a:xfrm>
+      </p:grpSpPr>
+      <p:sp>
+        <p:nvSpPr>
+          <p:cNvPr id="2" name="Title 1"/>
+          <p:cNvSpPr>
+            <a:spLocks noGrp="1"/>
+          </p:cNvSpPr>
+          <p:nvPr>
+            <p:ph type="title"/>
+          </p:nvPr>
+        </p:nvSpPr>
+        <p:spPr/>
+        <p:txBody>
+          <a:bodyPr/>
+          <a:lstStyle/>
+          <a:p>
+            <a:r>
+              <a:rPr lang="en-US" dirty="0" smtClean="0"/>
+              <a:t>Defining an Expectation for the Plugin</a:t>
+            </a:r>
+            <a:endParaRPr lang="en-US" dirty="0"/>
+          </a:p>
+        </p:txBody>
+      </p:sp>
+      <p:sp>
+        <p:nvSpPr>
+          <p:cNvPr id="3" name="Content Placeholder 2"/>
+          <p:cNvSpPr>
+            <a:spLocks noGrp="1"/>
+          </p:cNvSpPr>
+          <p:nvPr>
+            <p:ph sz="quarter" idx="10"/>
+          </p:nvPr>
+        </p:nvSpPr>
+        <p:spPr/>
+        <p:txBody>
+          <a:bodyPr/>
+          <a:lstStyle/>
+          <a:p>
+            <a:r>
+              <a:rPr lang="en-US" b="1" dirty="0" err="1"/>
+              <a:t>plugin_directory</a:t>
+            </a:r>
+            <a:r>
+              <a:rPr lang="en-US" b="1" dirty="0"/>
+              <a:t> = '/</a:t>
+            </a:r>
+            <a:r>
+              <a:rPr lang="en-US" b="1" dirty="0" err="1"/>
+              <a:t>tmp</a:t>
+            </a:r>
+            <a:r>
+              <a:rPr lang="en-US" b="1" dirty="0"/>
+              <a:t>/kitchen/</a:t>
+            </a:r>
+            <a:r>
+              <a:rPr lang="en-US" b="1" dirty="0" err="1"/>
+              <a:t>ohai</a:t>
+            </a:r>
+            <a:r>
+              <a:rPr lang="en-US" b="1" dirty="0"/>
+              <a:t>/plugins'</a:t>
+            </a:r>
+          </a:p>
+          <a:p>
+            <a:endParaRPr lang="en-US" b="1" dirty="0"/>
+          </a:p>
+          <a:p>
+            <a:r>
+              <a:rPr lang="en-US" b="1" dirty="0"/>
+              <a:t>describe command("</a:t>
+            </a:r>
+            <a:r>
+              <a:rPr lang="en-US" b="1" dirty="0" err="1"/>
+              <a:t>ohai</a:t>
+            </a:r>
+            <a:r>
+              <a:rPr lang="en-US" b="1" dirty="0"/>
+              <a:t> -d #{</a:t>
+            </a:r>
+            <a:r>
+              <a:rPr lang="en-US" b="1" dirty="0" err="1"/>
+              <a:t>plugin_directory</a:t>
+            </a:r>
+            <a:r>
+              <a:rPr lang="en-US" b="1" dirty="0"/>
+              <a:t>} apache") do</a:t>
+            </a:r>
+          </a:p>
+          <a:p>
+            <a:r>
+              <a:rPr lang="en-US" b="1" dirty="0"/>
+              <a:t>  its(:</a:t>
+            </a:r>
+            <a:r>
+              <a:rPr lang="en-US" b="1" dirty="0" err="1"/>
+              <a:t>stdout</a:t>
+            </a:r>
+            <a:r>
+              <a:rPr lang="en-US" b="1" dirty="0"/>
+              <a:t>) { should match(/</a:t>
+            </a:r>
+            <a:r>
+              <a:rPr lang="en-US" b="1" dirty="0" err="1"/>
+              <a:t>core_module</a:t>
+            </a:r>
+            <a:r>
+              <a:rPr lang="en-US" b="1" dirty="0"/>
+              <a:t>/) }</a:t>
+            </a:r>
+          </a:p>
+          <a:p>
+            <a:r>
+              <a:rPr lang="en-US" b="1" dirty="0"/>
+              <a:t>end</a:t>
+            </a:r>
+          </a:p>
+        </p:txBody>
+      </p:sp>
+      <p:sp>
+        <p:nvSpPr>
+          <p:cNvPr id="4" name="Text Placeholder 3"/>
+          <p:cNvSpPr>
+            <a:spLocks noGrp="1"/>
+          </p:cNvSpPr>
+          <p:nvPr>
+            <p:ph type="body" sz="quarter" idx="11"/>
+          </p:nvPr>
+        </p:nvSpPr>
+        <p:spPr/>
+        <p:txBody>
+          <a:bodyPr/>
+          <a:lstStyle/>
+          <a:p>
+            <a:r>
+              <a:rPr lang="en-US" dirty="0" smtClean="0"/>
+              <a:t>~/</a:t>
+            </a:r>
+            <a:r>
+              <a:rPr lang="en-US" dirty="0" err="1" smtClean="0"/>
+              <a:t>httpd</a:t>
+            </a:r>
+            <a:r>
+              <a:rPr lang="en-US" dirty="0" smtClean="0"/>
+              <a:t>/test/recipes/</a:t>
+            </a:r>
+            <a:r>
+              <a:rPr lang="en-US" dirty="0" err="1" smtClean="0"/>
+              <a:t>ohai_httpd_modules.rb</a:t>
+            </a:r>
+            <a:endParaRPr lang="en-US" dirty="0"/>
+          </a:p>
+        </p:txBody>
+      </p:sp>
+    </p:spTree>
+    <p:extLst>
+      <p:ext uri="{BB962C8B-B14F-4D97-AF65-F5344CB8AC3E}">
+        <p14:creationId xmlns:p14="http://schemas.microsoft.com/office/powerpoint/2010/main" val="2003418142"/>
+      </p:ext>
+    </p:extLst>
+  </p:cSld>
+  <p:clrMapOvr>
+    <a:masterClrMapping/>
+  </p:clrMapOvr>
+  <p:transition xmlns:p14="http://schemas.microsoft.com/office/powerpoint/2010/main" spd="med">
+    <p:fade/>
+  </p:transition>
+  <p:timing>
+    <p:tnLst>
+      <p:par>
+        <p:cTn xmlns:p14="http://schemas.microsoft.com/office/powerpoint/2010/main" id="1" dur="indefinite" restart="never" nodeType="tmRoot"/>
+      </p:par>
+    </p:tnLst>
+  </p:timing>
+</p:sld>
+</file>
+
+<file path=ppt/slides/slide29.xml><?xml version="1.0" encoding="utf-8"?>
+<p:sld xmlns:a="http://schemas.openxmlformats.org/drawingml/2006/main" xmlns:r="http://schemas.openxmlformats.org/officeDocument/2006/relationships" xmlns:p="http://schemas.openxmlformats.org/presentationml/2006/main">
+  <p:cSld>
+    <p:spTree>
+      <p:nvGrpSpPr>
+        <p:cNvPr id="1" name=""/>
+        <p:cNvGrpSpPr/>
+        <p:nvPr/>
+      </p:nvGrpSpPr>
+      <p:grpSpPr>
+        <a:xfrm>
+          <a:off x="0" y="0"/>
+          <a:ext cx="0" cy="0"/>
+          <a:chOff x="0" y="0"/>
+          <a:chExt cx="0" cy="0"/>
+        </a:xfrm>
+      </p:grpSpPr>
+      <p:sp>
+        <p:nvSpPr>
+          <p:cNvPr id="2" name="Content Placeholder 1"/>
+          <p:cNvSpPr>
+            <a:spLocks noGrp="1"/>
+          </p:cNvSpPr>
+          <p:nvPr>
+            <p:ph sz="quarter" idx="10"/>
+          </p:nvPr>
+        </p:nvSpPr>
+        <p:spPr/>
+        <p:txBody>
+          <a:bodyPr/>
+          <a:lstStyle/>
+          <a:p>
+            <a:r>
+              <a:rPr lang="en-US" b="1" dirty="0"/>
+              <a:t>-----&gt; Starting Kitchen (v1.11.1)</a:t>
+            </a:r>
+          </a:p>
+          <a:p>
+            <a:r>
+              <a:rPr lang="en-US" b="1" dirty="0"/>
+              <a:t>-----&gt; Verifying &lt;ohai-plugin-centos-67&gt;...</a:t>
+            </a:r>
+          </a:p>
+          <a:p>
+            <a:r>
+              <a:rPr lang="en-US" b="1" dirty="0"/>
+              <a:t>       Use `/home/chef/</a:t>
+            </a:r>
+            <a:r>
+              <a:rPr lang="en-US" b="1" dirty="0" err="1"/>
+              <a:t>httpd</a:t>
+            </a:r>
+            <a:r>
+              <a:rPr lang="en-US" b="1" dirty="0"/>
+              <a:t>/test/recipes</a:t>
+            </a:r>
+            <a:r>
+              <a:rPr lang="en-US" b="1" dirty="0" smtClean="0"/>
+              <a:t>/default` </a:t>
+            </a:r>
+            <a:r>
+              <a:rPr lang="en-US" b="1" dirty="0"/>
+              <a:t>for testing</a:t>
+            </a:r>
+          </a:p>
+          <a:p>
+            <a:endParaRPr lang="en-US" b="1" dirty="0"/>
+          </a:p>
+          <a:p>
+            <a:r>
+              <a:rPr lang="en-US" b="1" dirty="0"/>
+              <a:t>Target:  </a:t>
+            </a:r>
+            <a:r>
+              <a:rPr lang="en-US" b="1" dirty="0" err="1"/>
+              <a:t>ssh</a:t>
+            </a:r>
+            <a:r>
+              <a:rPr lang="en-US" b="1" dirty="0"/>
+              <a:t>://kitchen@localhost:32768</a:t>
+            </a:r>
+          </a:p>
+          <a:p>
+            <a:endParaRPr lang="en-US" b="1" dirty="0"/>
+          </a:p>
+          <a:p>
+            <a:r>
+              <a:rPr lang="en-US" b="1" dirty="0"/>
+              <a:t>  ✔  Command </a:t>
+            </a:r>
+            <a:r>
+              <a:rPr lang="en-US" b="1" dirty="0" err="1"/>
+              <a:t>ohai</a:t>
+            </a:r>
+            <a:r>
+              <a:rPr lang="en-US" b="1" dirty="0"/>
+              <a:t> -d /</a:t>
+            </a:r>
+            <a:r>
+              <a:rPr lang="en-US" b="1" dirty="0" err="1"/>
+              <a:t>tmp</a:t>
+            </a:r>
+            <a:r>
+              <a:rPr lang="en-US" b="1" dirty="0"/>
+              <a:t>/kitchen/</a:t>
+            </a:r>
+            <a:r>
+              <a:rPr lang="en-US" b="1" dirty="0" err="1"/>
+              <a:t>ohai</a:t>
+            </a:r>
+            <a:r>
+              <a:rPr lang="en-US" b="1" dirty="0"/>
+              <a:t>/plugins apache </a:t>
+            </a:r>
+            <a:r>
+              <a:rPr lang="en-US" b="1" dirty="0" err="1"/>
+              <a:t>stdout</a:t>
+            </a:r>
+            <a:r>
+              <a:rPr lang="en-US" b="1" dirty="0"/>
+              <a:t> should match /</a:t>
+            </a:r>
+            <a:r>
+              <a:rPr lang="en-US" b="1" dirty="0" err="1"/>
+              <a:t>core_module</a:t>
+            </a:r>
+            <a:r>
+              <a:rPr lang="en-US" b="1" dirty="0"/>
+              <a:t> \(static\)/</a:t>
+            </a:r>
+          </a:p>
+          <a:p>
+            <a:endParaRPr lang="en-US" b="1" dirty="0"/>
+          </a:p>
+          <a:p>
+            <a:r>
+              <a:rPr lang="en-US" b="1" dirty="0"/>
+              <a:t>Summary: </a:t>
+            </a:r>
+            <a:r>
+              <a:rPr lang="en-US" b="1" dirty="0" smtClean="0"/>
+              <a:t>1 </a:t>
+            </a:r>
+            <a:r>
+              <a:rPr lang="en-US" b="1" dirty="0"/>
+              <a:t>successful, 0 failures, 0 </a:t>
+            </a:r>
+            <a:r>
+              <a:rPr lang="en-US" b="1" dirty="0" smtClean="0"/>
+              <a:t>skipped</a:t>
+            </a:r>
+            <a:endParaRPr lang="en-US" b="1" dirty="0"/>
+          </a:p>
+        </p:txBody>
+      </p:sp>
+      <p:sp>
+        <p:nvSpPr>
+          <p:cNvPr id="3" name="Text Placeholder 2"/>
+          <p:cNvSpPr>
+            <a:spLocks noGrp="1"/>
+          </p:cNvSpPr>
+          <p:nvPr>
+            <p:ph type="body" sz="quarter" idx="11"/>
+          </p:nvPr>
+        </p:nvSpPr>
+        <p:spPr/>
+        <p:txBody>
+          <a:bodyPr/>
+          <a:lstStyle/>
+          <a:p>
+            <a:r>
+              <a:rPr lang="en-US" dirty="0" smtClean="0"/>
+              <a:t>&gt; kitchen verify</a:t>
+            </a:r>
+            <a:endParaRPr lang="en-US" dirty="0"/>
+          </a:p>
+        </p:txBody>
+      </p:sp>
+      <p:sp>
+        <p:nvSpPr>
+          <p:cNvPr id="4" name="Content Placeholder 3"/>
+          <p:cNvSpPr>
+            <a:spLocks noGrp="1"/>
+          </p:cNvSpPr>
+          <p:nvPr>
+            <p:ph sz="quarter" idx="12"/>
+          </p:nvPr>
+        </p:nvSpPr>
+        <p:spPr>
+          <a:xfrm>
+            <a:off x="1127883" y="5467422"/>
+            <a:ext cx="14420850" cy="969437"/>
+          </a:xfrm>
+        </p:spPr>
+        <p:txBody>
+          <a:bodyPr/>
+          <a:lstStyle/>
+          <a:p>
+            <a:endParaRPr lang="en-US" dirty="0"/>
+          </a:p>
+        </p:txBody>
+      </p:sp>
+      <p:sp>
+        <p:nvSpPr>
+          <p:cNvPr id="5" name="Title 4"/>
+          <p:cNvSpPr>
+            <a:spLocks noGrp="1"/>
+          </p:cNvSpPr>
+          <p:nvPr>
+            <p:ph type="title"/>
+          </p:nvPr>
+        </p:nvSpPr>
+        <p:spPr/>
+        <p:txBody>
+          <a:bodyPr/>
+          <a:lstStyle/>
+          <a:p>
+            <a:r>
+              <a:rPr lang="en-US" dirty="0" smtClean="0"/>
+              <a:t>Verifying the New Expectation</a:t>
+            </a:r>
+            <a:endParaRPr lang="en-US" dirty="0"/>
+          </a:p>
+        </p:txBody>
+      </p:sp>
+    </p:spTree>
+    <p:extLst>
+      <p:ext uri="{BB962C8B-B14F-4D97-AF65-F5344CB8AC3E}">
+        <p14:creationId xmlns:p14="http://schemas.microsoft.com/office/powerpoint/2010/main" val="1011817208"/>
+      </p:ext>
+    </p:extLst>
+  </p:cSld>
+  <p:clrMapOvr>
+    <a:masterClrMapping/>
+  </p:clrMapOvr>
+  <p:transition xmlns:p14="http://schemas.microsoft.com/office/powerpoint/2010/main" spd="med">
+    <p:fade/>
+  </p:transition>
+  <p:timing>
+    <p:tnLst>
+      <p:par>
+        <p:cTn xmlns:p14="http://schemas.microsoft.com/office/powerpoint/2010/main" id="1" dur="indefinite" restart="never" nodeType="tmRoot"/>
+      </p:par>
+    </p:tnLst>
+  </p:timing>
 </p:sld>
 </file>
 
@@ -12635,6 +13671,16 @@
               <a:t> plugin</a:t>
             </a:r>
           </a:p>
+          <a:p>
+            <a:pPr marL="342900" indent="-342900">
+              <a:buFont typeface="Wingdings" charset="2"/>
+              <a:buChar char="q"/>
+            </a:pPr>
+            <a:r>
+              <a:rPr lang="en-US" dirty="0" smtClean="0"/>
+              <a:t>Define an integration test</a:t>
+            </a:r>
+          </a:p>
         </p:txBody>
       </p:sp>
     </p:spTree>
@@ -12650,6 +13696,340 @@
   <p:transition xmlns:p14="http://schemas.microsoft.com/office/powerpoint/2010/main" spd="med">
     <p:fade/>
   </p:transition>
+  <p:timing>
+    <p:tnLst>
+      <p:par>
+        <p:cTn xmlns:p14="http://schemas.microsoft.com/office/powerpoint/2010/main" id="1" dur="indefinite" restart="never" nodeType="tmRoot"/>
+      </p:par>
+    </p:tnLst>
+  </p:timing>
+</p:sld>
+</file>
+
+<file path=ppt/slides/slide30.xml><?xml version="1.0" encoding="utf-8"?>
+<p:sld xmlns:a="http://schemas.openxmlformats.org/drawingml/2006/main" xmlns:r="http://schemas.openxmlformats.org/officeDocument/2006/relationships" xmlns:p="http://schemas.openxmlformats.org/presentationml/2006/main">
+  <p:cSld>
+    <p:spTree>
+      <p:nvGrpSpPr>
+        <p:cNvPr id="1" name=""/>
+        <p:cNvGrpSpPr/>
+        <p:nvPr/>
+      </p:nvGrpSpPr>
+      <p:grpSpPr>
+        <a:xfrm>
+          <a:off x="0" y="0"/>
+          <a:ext cx="0" cy="0"/>
+          <a:chOff x="0" y="0"/>
+          <a:chExt cx="0" cy="0"/>
+        </a:xfrm>
+      </p:grpSpPr>
+      <p:sp>
+        <p:nvSpPr>
+          <p:cNvPr id="2" name="Title 1"/>
+          <p:cNvSpPr>
+            <a:spLocks noGrp="1"/>
+          </p:cNvSpPr>
+          <p:nvPr>
+            <p:ph type="ctrTitle"/>
+          </p:nvPr>
+        </p:nvSpPr>
+        <p:spPr/>
+        <p:txBody>
+          <a:bodyPr>
+            <a:normAutofit fontScale="90000"/>
+          </a:bodyPr>
+          <a:lstStyle/>
+          <a:p>
+            <a:r>
+              <a:rPr lang="en-US" dirty="0" smtClean="0"/>
+              <a:t>Creating an </a:t>
+            </a:r>
+            <a:r>
+              <a:rPr lang="en-US" dirty="0" err="1" smtClean="0"/>
+              <a:t>Ohai</a:t>
+            </a:r>
+            <a:r>
+              <a:rPr lang="en-US" dirty="0" smtClean="0"/>
+              <a:t> Plugin</a:t>
+            </a:r>
+            <a:endParaRPr lang="en-US" dirty="0"/>
+          </a:p>
+        </p:txBody>
+      </p:sp>
+      <p:sp>
+        <p:nvSpPr>
+          <p:cNvPr id="3" name="Content Placeholder 2"/>
+          <p:cNvSpPr>
+            <a:spLocks noGrp="1"/>
+          </p:cNvSpPr>
+          <p:nvPr>
+            <p:ph sz="quarter" idx="11"/>
+          </p:nvPr>
+        </p:nvSpPr>
+        <p:spPr/>
+        <p:txBody>
+          <a:bodyPr/>
+          <a:lstStyle/>
+          <a:p>
+            <a:r>
+              <a:rPr lang="en-US" dirty="0" smtClean="0"/>
+              <a:t>Being able to learn more about our nodes will make our reporting more powerful and benefit the recipes we write.</a:t>
+            </a:r>
+            <a:endParaRPr lang="en-US" dirty="0"/>
+          </a:p>
+        </p:txBody>
+      </p:sp>
+      <p:sp>
+        <p:nvSpPr>
+          <p:cNvPr id="4" name="Text Placeholder 3"/>
+          <p:cNvSpPr>
+            <a:spLocks noGrp="1"/>
+          </p:cNvSpPr>
+          <p:nvPr>
+            <p:ph type="body" sz="quarter" idx="10"/>
+          </p:nvPr>
+        </p:nvSpPr>
+        <p:spPr/>
+        <p:txBody>
+          <a:bodyPr/>
+          <a:lstStyle/>
+          <a:p>
+            <a:pPr marL="342900" indent="-342900">
+              <a:buFont typeface="Wingdings" charset="2"/>
+              <a:buChar char="ü"/>
+            </a:pPr>
+            <a:r>
+              <a:rPr lang="en-US" dirty="0" smtClean="0"/>
+              <a:t>Define expectations for the </a:t>
+            </a:r>
+            <a:r>
+              <a:rPr lang="en-US" dirty="0" err="1" smtClean="0"/>
+              <a:t>Ohai</a:t>
+            </a:r>
+            <a:r>
+              <a:rPr lang="en-US" dirty="0" smtClean="0"/>
+              <a:t> plugin</a:t>
+            </a:r>
+          </a:p>
+          <a:p>
+            <a:pPr marL="342900" indent="-342900">
+              <a:buFont typeface="Wingdings" charset="2"/>
+              <a:buChar char="ü"/>
+            </a:pPr>
+            <a:r>
+              <a:rPr lang="en-US" dirty="0" smtClean="0"/>
+              <a:t>Create the </a:t>
+            </a:r>
+            <a:r>
+              <a:rPr lang="en-US" dirty="0" err="1" smtClean="0"/>
+              <a:t>Ohai</a:t>
+            </a:r>
+            <a:r>
+              <a:rPr lang="en-US" dirty="0" smtClean="0"/>
+              <a:t> plugin</a:t>
+            </a:r>
+          </a:p>
+          <a:p>
+            <a:pPr marL="342900" indent="-342900">
+              <a:buFont typeface="Wingdings" charset="2"/>
+              <a:buChar char="ü"/>
+            </a:pPr>
+            <a:r>
+              <a:rPr lang="en-US" dirty="0" smtClean="0"/>
+              <a:t>Define expectations for the recipe to deliver the </a:t>
+            </a:r>
+            <a:r>
+              <a:rPr lang="en-US" dirty="0" err="1" smtClean="0"/>
+              <a:t>Ohai</a:t>
+            </a:r>
+            <a:r>
+              <a:rPr lang="en-US" dirty="0" smtClean="0"/>
+              <a:t> plugin</a:t>
+            </a:r>
+          </a:p>
+          <a:p>
+            <a:pPr marL="342900" indent="-342900">
+              <a:buFont typeface="Wingdings" charset="2"/>
+              <a:buChar char="ü"/>
+            </a:pPr>
+            <a:r>
+              <a:rPr lang="en-US" dirty="0" smtClean="0"/>
+              <a:t>Create the recipe that delivers the </a:t>
+            </a:r>
+            <a:r>
+              <a:rPr lang="en-US" dirty="0" err="1" smtClean="0"/>
+              <a:t>Ohai</a:t>
+            </a:r>
+            <a:r>
+              <a:rPr lang="en-US" dirty="0" smtClean="0"/>
+              <a:t> plugin</a:t>
+            </a:r>
+          </a:p>
+          <a:p>
+            <a:pPr marL="342900" indent="-342900">
+              <a:buFont typeface="Wingdings" charset="2"/>
+              <a:buChar char="ü"/>
+            </a:pPr>
+            <a:r>
+              <a:rPr lang="en-US" dirty="0"/>
+              <a:t>Define an integration </a:t>
+            </a:r>
+            <a:r>
+              <a:rPr lang="en-US" dirty="0" smtClean="0"/>
+              <a:t>test</a:t>
+            </a:r>
+            <a:endParaRPr lang="en-US" dirty="0"/>
+          </a:p>
+        </p:txBody>
+      </p:sp>
+    </p:spTree>
+    <p:extLst>
+      <p:ext uri="{BB962C8B-B14F-4D97-AF65-F5344CB8AC3E}">
+        <p14:creationId xmlns:p14="http://schemas.microsoft.com/office/powerpoint/2010/main" val="349100700"/>
+      </p:ext>
+    </p:extLst>
+  </p:cSld>
+  <p:clrMapOvr>
+    <a:masterClrMapping/>
+  </p:clrMapOvr>
+  <p:transition xmlns:p14="http://schemas.microsoft.com/office/powerpoint/2010/main" spd="med">
+    <p:fade/>
+  </p:transition>
+  <p:timing>
+    <p:tnLst>
+      <p:par>
+        <p:cTn xmlns:p14="http://schemas.microsoft.com/office/powerpoint/2010/main" id="1" dur="indefinite" restart="never" nodeType="tmRoot"/>
+      </p:par>
+    </p:tnLst>
+  </p:timing>
+</p:sld>
+</file>
+
+<file path=ppt/slides/slide31.xml><?xml version="1.0" encoding="utf-8"?>
+<p:sld xmlns:a="http://schemas.openxmlformats.org/drawingml/2006/main" xmlns:r="http://schemas.openxmlformats.org/officeDocument/2006/relationships" xmlns:p="http://schemas.openxmlformats.org/presentationml/2006/main">
+  <p:cSld>
+    <p:spTree>
+      <p:nvGrpSpPr>
+        <p:cNvPr id="1" name=""/>
+        <p:cNvGrpSpPr/>
+        <p:nvPr/>
+      </p:nvGrpSpPr>
+      <p:grpSpPr>
+        <a:xfrm>
+          <a:off x="0" y="0"/>
+          <a:ext cx="0" cy="0"/>
+          <a:chOff x="0" y="0"/>
+          <a:chExt cx="0" cy="0"/>
+        </a:xfrm>
+      </p:grpSpPr>
+      <p:sp>
+        <p:nvSpPr>
+          <p:cNvPr id="2" name="Title 1"/>
+          <p:cNvSpPr>
+            <a:spLocks noGrp="1"/>
+          </p:cNvSpPr>
+          <p:nvPr>
+            <p:ph type="ctrTitle"/>
+          </p:nvPr>
+        </p:nvSpPr>
+        <p:spPr/>
+        <p:txBody>
+          <a:bodyPr>
+            <a:normAutofit fontScale="90000"/>
+          </a:bodyPr>
+          <a:lstStyle/>
+          <a:p>
+            <a:r>
+              <a:rPr lang="en-US" dirty="0" smtClean="0"/>
+              <a:t>Q&amp;A</a:t>
+            </a:r>
+            <a:endParaRPr lang="en-US" dirty="0"/>
+          </a:p>
+        </p:txBody>
+      </p:sp>
+      <p:sp>
+        <p:nvSpPr>
+          <p:cNvPr id="3" name="Subtitle 2"/>
+          <p:cNvSpPr>
+            <a:spLocks noGrp="1"/>
+          </p:cNvSpPr>
+          <p:nvPr>
+            <p:ph type="subTitle" idx="1"/>
+          </p:nvPr>
+        </p:nvSpPr>
+        <p:spPr/>
+        <p:txBody>
+          <a:bodyPr/>
+          <a:lstStyle/>
+          <a:p>
+            <a:r>
+              <a:rPr lang="en-US" dirty="0" smtClean="0"/>
+              <a:t>What questions can we answer for you?</a:t>
+            </a:r>
+            <a:endParaRPr lang="en-US" dirty="0"/>
+          </a:p>
+        </p:txBody>
+      </p:sp>
+    </p:spTree>
+    <p:extLst>
+      <p:ext uri="{BB962C8B-B14F-4D97-AF65-F5344CB8AC3E}">
+        <p14:creationId xmlns:p14="http://schemas.microsoft.com/office/powerpoint/2010/main" val="941952846"/>
+      </p:ext>
+    </p:extLst>
+  </p:cSld>
+  <p:clrMapOvr>
+    <a:masterClrMapping/>
+  </p:clrMapOvr>
+  <p:transition xmlns:p14="http://schemas.microsoft.com/office/powerpoint/2010/main" spd="med">
+    <p:fade/>
+  </p:transition>
+  <p:timing>
+    <p:tnLst>
+      <p:par>
+        <p:cTn xmlns:p14="http://schemas.microsoft.com/office/powerpoint/2010/main" id="1" dur="indefinite" restart="never" nodeType="tmRoot"/>
+      </p:par>
+    </p:tnLst>
+  </p:timing>
+</p:sld>
+</file>
+
+<file path=ppt/slides/slide32.xml><?xml version="1.0" encoding="utf-8"?>
+<p:sld xmlns:a="http://schemas.openxmlformats.org/drawingml/2006/main" xmlns:r="http://schemas.openxmlformats.org/officeDocument/2006/relationships" xmlns:p="http://schemas.openxmlformats.org/presentationml/2006/main">
+  <p:cSld>
+    <p:spTree>
+      <p:nvGrpSpPr>
+        <p:cNvPr id="1" name=""/>
+        <p:cNvGrpSpPr/>
+        <p:nvPr/>
+      </p:nvGrpSpPr>
+      <p:grpSpPr>
+        <a:xfrm>
+          <a:off x="0" y="0"/>
+          <a:ext cx="0" cy="0"/>
+          <a:chOff x="0" y="0"/>
+          <a:chExt cx="0" cy="0"/>
+        </a:xfrm>
+      </p:grpSpPr>
+    </p:spTree>
+    <p:extLst>
+      <p:ext uri="{BB962C8B-B14F-4D97-AF65-F5344CB8AC3E}">
+        <p14:creationId xmlns:p14="http://schemas.microsoft.com/office/powerpoint/2010/main" val="4132643939"/>
+      </p:ext>
+    </p:extLst>
+  </p:cSld>
+  <p:clrMapOvr>
+    <a:masterClrMapping/>
+  </p:clrMapOvr>
+  <p:transition xmlns:p14="http://schemas.microsoft.com/office/powerpoint/2010/main" spd="med">
+    <p:fade/>
+  </p:transition>
+  <p:timing>
+    <p:tnLst>
+      <p:par>
+        <p:cTn xmlns:p14="http://schemas.microsoft.com/office/powerpoint/2010/main" id="1" dur="indefinite" restart="never" nodeType="tmRoot"/>
+      </p:par>
+    </p:tnLst>
+  </p:timing>
 </p:sld>
 </file>
 
@@ -12695,7 +14075,6 @@
               <a:rPr lang="en-US" b="1" dirty="0"/>
               <a:t>1 gem installed</a:t>
             </a:r>
-            <a:endParaRPr lang="en-US" b="1" dirty="0"/>
           </a:p>
         </p:txBody>
       </p:sp>
@@ -12770,6 +14149,13 @@
   <p:transition xmlns:p14="http://schemas.microsoft.com/office/powerpoint/2010/main" spd="med">
     <p:fade/>
   </p:transition>
+  <p:timing>
+    <p:tnLst>
+      <p:par>
+        <p:cTn xmlns:p14="http://schemas.microsoft.com/office/powerpoint/2010/main" id="1" dur="indefinite" restart="never" nodeType="tmRoot"/>
+      </p:par>
+    </p:tnLst>
+  </p:timing>
 </p:sld>
 </file>
 
@@ -12905,7 +14291,23 @@
           <a:bodyPr/>
           <a:lstStyle/>
           <a:p>
-            <a:endParaRPr lang="en-US"/>
+            <a:r>
+              <a:rPr lang="en-US" dirty="0" smtClean="0"/>
+              <a:t>~/cookbooks/</a:t>
+            </a:r>
+            <a:r>
+              <a:rPr lang="en-US" dirty="0" err="1" smtClean="0"/>
+              <a:t>httpd</a:t>
+            </a:r>
+            <a:r>
+              <a:rPr lang="en-US" dirty="0" smtClean="0"/>
+              <a:t>/spec/</a:t>
+            </a:r>
+            <a:r>
+              <a:rPr lang="en-US" dirty="0" err="1" smtClean="0"/>
+              <a:t>spec_helper.rb</a:t>
+            </a:r>
+            <a:endParaRPr lang="en-US" dirty="0"/>
           </a:p>
         </p:txBody>
       </p:sp>
@@ -12946,6 +14348,13 @@
   <p:transition xmlns:p14="http://schemas.microsoft.com/office/powerpoint/2010/main" spd="med">
     <p:fade/>
   </p:transition>
+  <p:timing>
+    <p:tnLst>
+      <p:par>
+        <p:cTn xmlns:p14="http://schemas.microsoft.com/office/powerpoint/2010/main" id="1" dur="indefinite" restart="never" nodeType="tmRoot"/>
+      </p:par>
+    </p:tnLst>
+  </p:timing>
 </p:sld>
 </file>
 
@@ -13060,6 +14469,13 @@
   <p:transition xmlns:p14="http://schemas.microsoft.com/office/powerpoint/2010/main" spd="med">
     <p:fade/>
   </p:transition>
+  <p:timing>
+    <p:tnLst>
+      <p:par>
+        <p:cTn xmlns:p14="http://schemas.microsoft.com/office/powerpoint/2010/main" id="1" dur="indefinite" restart="never" nodeType="tmRoot"/>
+      </p:par>
+    </p:tnLst>
+  </p:timing>
 </p:sld>
 </file>
 
@@ -13182,7 +14598,7 @@
             </a:r>
             <a:r>
               <a:rPr lang="en-US" b="1" dirty="0" err="1" smtClean="0"/>
-              <a:t>provide_attribute</a:t>
+              <a:t>provides_attribute</a:t>
             </a:r>
             <a:r>
               <a:rPr lang="en-US" b="1" dirty="0" smtClean="0"/>
@@ -13253,6 +14669,13 @@
   <p:transition xmlns:p14="http://schemas.microsoft.com/office/powerpoint/2010/main" spd="med">
     <p:fade/>
   </p:transition>
+  <p:timing>
+    <p:tnLst>
+      <p:par>
+        <p:cTn xmlns:p14="http://schemas.microsoft.com/office/powerpoint/2010/main" id="1" dur="indefinite" restart="never" nodeType="tmRoot"/>
+      </p:par>
+    </p:tnLst>
+  </p:timing>
 </p:sld>
 </file>
 
@@ -13466,6 +14889,13 @@
   <p:transition xmlns:p14="http://schemas.microsoft.com/office/powerpoint/2010/main" spd="med">
     <p:fade/>
   </p:transition>
+  <p:timing>
+    <p:tnLst>
+      <p:par>
+        <p:cTn xmlns:p14="http://schemas.microsoft.com/office/powerpoint/2010/main" id="1" dur="indefinite" restart="never" nodeType="tmRoot"/>
+      </p:par>
+    </p:tnLst>
+  </p:timing>
 </p:sld>
 </file>
 
@@ -13628,6 +15058,21 @@
               <a:t> plugin</a:t>
             </a:r>
           </a:p>
+          <a:p>
+            <a:pPr marL="342900" indent="-342900">
+              <a:buFont typeface="Wingdings" charset="2"/>
+              <a:buChar char="q"/>
+            </a:pPr>
+            <a:r>
+              <a:rPr lang="en-US" dirty="0"/>
+              <a:t>Define an integration </a:t>
+            </a:r>
+            <a:r>
+              <a:rPr lang="en-US" dirty="0" smtClean="0"/>
+              <a:t>test</a:t>
+            </a:r>
+            <a:endParaRPr lang="en-US" dirty="0"/>
+          </a:p>
         </p:txBody>
       </p:sp>
     </p:spTree>
@@ -13643,6 +15088,13 @@
   <p:transition xmlns:p14="http://schemas.microsoft.com/office/powerpoint/2010/main" spd="med">
     <p:fade/>
   </p:transition>
+  <p:timing>
+    <p:tnLst>
+      <p:par>
+        <p:cTn xmlns:p14="http://schemas.microsoft.com/office/powerpoint/2010/main" id="1" dur="indefinite" restart="never" nodeType="tmRoot"/>
+      </p:par>
+    </p:tnLst>
+  </p:timing>
 </p:sld>
 </file>
 
@@ -14022,7 +15474,7 @@
   <a:extraClrSchemeLst/>
   <a:extLst>
     <a:ext uri="{05A4C25C-085E-4340-85A3-A5531E510DB2}">
-      <thm15:themeFamily xmlns:thm15="http://schemas.microsoft.com/office/thememl/2012/main" xmlns="" name="Chef-TemplateComps_v09-16x9-Light.potx" id="{078CEFDB-FA7A-4E36-9964-13EF367585CB}" vid="{8B87B0F3-7308-43D5-8388-E1B49EA02652}"/>
+      <thm15:themeFamily xmlns="" xmlns:thm15="http://schemas.microsoft.com/office/thememl/2012/main" name="Chef-TemplateComps_v09-16x9-Light.potx" id="{078CEFDB-FA7A-4E36-9964-13EF367585CB}" vid="{8B87B0F3-7308-43D5-8388-E1B49EA02652}"/>
     </a:ext>
   </a:extLst>
 </a:theme>
@@ -14404,7 +15856,7 @@
   <a:extraClrSchemeLst/>
   <a:extLst>
     <a:ext uri="{05A4C25C-085E-4340-85A3-A5531E510DB2}">
-      <thm15:themeFamily xmlns:thm15="http://schemas.microsoft.com/office/thememl/2012/main" xmlns="" name="Chef-TemplateComps_v09-16x9-Light.potx" id="{078CEFDB-FA7A-4E36-9964-13EF367585CB}" vid="{8B87B0F3-7308-43D5-8388-E1B49EA02652}"/>
+      <thm15:themeFamily xmlns="" xmlns:thm15="http://schemas.microsoft.com/office/thememl/2012/main" name="Chef-TemplateComps_v09-16x9-Light.potx" id="{078CEFDB-FA7A-4E36-9964-13EF367585CB}" vid="{8B87B0F3-7308-43D5-8388-E1B49EA02652}"/>
     </a:ext>
   </a:extLst>
 </a:theme>
@@ -14978,6 +16430,52 @@
 
 <file path=customXml/item1.xml><?xml version="1.0" encoding="utf-8"?>
 <?mso-contentType ?>
+<spe:Receivers xmlns:spe="http://schemas.microsoft.com/sharepoint/events">
+  <Receiver>
+    <Name>Document ID Generator</Name>
+    <Synchronization>Synchronous</Synchronization>
+    <Type>10001</Type>
+    <SequenceNumber>1000</SequenceNumber>
+    <Assembly>Microsoft.Office.DocumentManagement, Version=14.0.0.0, Culture=neutral, PublicKeyToken=71e9bce111e9429c</Assembly>
+    <Class>Microsoft.Office.DocumentManagement.Internal.DocIdHandler</Class>
+    <Data/>
+    <Filter/>
+  </Receiver>
+  <Receiver>
+    <Name>Document ID Generator</Name>
+    <Synchronization>Synchronous</Synchronization>
+    <Type>10002</Type>
+    <SequenceNumber>1001</SequenceNumber>
+    <Assembly>Microsoft.Office.DocumentManagement, Version=14.0.0.0, Culture=neutral, PublicKeyToken=71e9bce111e9429c</Assembly>
+    <Class>Microsoft.Office.DocumentManagement.Internal.DocIdHandler</Class>
+    <Data/>
+    <Filter/>
+  </Receiver>
+  <Receiver>
+    <Name>Document ID Generator</Name>
+    <Synchronization>Synchronous</Synchronization>
+    <Type>10004</Type>
+    <SequenceNumber>1002</SequenceNumber>
+    <Assembly>Microsoft.Office.DocumentManagement, Version=14.0.0.0, Culture=neutral, PublicKeyToken=71e9bce111e9429c</Assembly>
+    <Class>Microsoft.Office.DocumentManagement.Internal.DocIdHandler</Class>
+    <Data/>
+    <Filter/>
+  </Receiver>
+  <Receiver>
+    <Name>Document ID Generator</Name>
+    <Synchronization>Synchronous</Synchronization>
+    <Type>10006</Type>
+    <SequenceNumber>1003</SequenceNumber>
+    <Assembly>Microsoft.Office.DocumentManagement, Version=14.0.0.0, Culture=neutral, PublicKeyToken=71e9bce111e9429c</Assembly>
+    <Class>Microsoft.Office.DocumentManagement.Internal.DocIdHandler</Class>
+    <Data/>
+    <Filter/>
+  </Receiver>
+</spe:Receivers>
+</file>
+
+<file path=customXml/item2.xml><?xml version="1.0" encoding="utf-8"?>
+<?mso-contentType ?>
 <FormTemplates xmlns="http://schemas.microsoft.com/sharepoint/v3/contenttype/forms">
   <Display>DocumentLibraryForm</Display>
   <Edit>DocumentLibraryForm</Edit>
@@ -14985,7 +16483,7 @@
 </FormTemplates>
 </file>
 
-<file path=customXml/item2.xml><?xml version="1.0" encoding="utf-8"?>
+<file path=customXml/item3.xml><?xml version="1.0" encoding="utf-8"?>
 <p:properties xmlns:p="http://schemas.microsoft.com/office/2006/metadata/properties" xmlns:xsi="http://www.w3.org/2001/XMLSchema-instance" xmlns:pc="http://schemas.microsoft.com/office/infopath/2007/PartnerControls">
   <documentManagement>
     <_dlc_DocId xmlns="7bb5d761-a2ea-4873-95f7-7a6658fb3ef0">M4CWTKMW727E-592-73</_dlc_DocId>
@@ -14997,7 +16495,7 @@
 </p:properties>
 </file>
 
-<file path=customXml/item3.xml><?xml version="1.0" encoding="utf-8"?>
+<file path=customXml/item4.xml><?xml version="1.0" encoding="utf-8"?>
 <ct:contentTypeSchema xmlns:ct="http://schemas.microsoft.com/office/2006/metadata/contentType" xmlns:ma="http://schemas.microsoft.com/office/2006/metadata/properties/metaAttributes" ct:_="" ma:_="" ma:contentTypeName="Document" ma:contentTypeID="0x0101000812F700BE7F874999720E88173FE491" ma:contentTypeVersion="0" ma:contentTypeDescription="Create a new document." ma:contentTypeScope="" ma:versionID="3f79f408e2ca720b7aba6e0e32464d0c">
   <xsd:schema xmlns:xsd="http://www.w3.org/2001/XMLSchema" xmlns:xs="http://www.w3.org/2001/XMLSchema" xmlns:p="http://schemas.microsoft.com/office/2006/metadata/properties" xmlns:ns2="7bb5d761-a2ea-4873-95f7-7a6658fb3ef0" targetNamespace="http://schemas.microsoft.com/office/2006/metadata/properties" ma:root="true" ma:fieldsID="1e062cd38ba31e406bfc4340fbc7f87a" ns2:_="">
     <xsd:import namespace="7bb5d761-a2ea-4873-95f7-7a6658fb3ef0"/>
@@ -15142,53 +16640,15 @@
 </ct:contentTypeSchema>
 </file>
 
-<file path=customXml/item4.xml><?xml version="1.0" encoding="utf-8"?>
-<?mso-contentType ?>
-<spe:Receivers xmlns:spe="http://schemas.microsoft.com/sharepoint/events">
-  <Receiver>
-    <Name>Document ID Generator</Name>
-    <Synchronization>Synchronous</Synchronization>
-    <Type>10001</Type>
-    <SequenceNumber>1000</SequenceNumber>
-    <Assembly>Microsoft.Office.DocumentManagement, Version=14.0.0.0, Culture=neutral, PublicKeyToken=71e9bce111e9429c</Assembly>
-    <Class>Microsoft.Office.DocumentManagement.Internal.DocIdHandler</Class>
-    <Data/>
-    <Filter/>
-  </Receiver>
-  <Receiver>
-    <Name>Document ID Generator</Name>
-    <Synchronization>Synchronous</Synchronization>
-    <Type>10002</Type>
-    <SequenceNumber>1001</SequenceNumber>
-    <Assembly>Microsoft.Office.DocumentManagement, Version=14.0.0.0, Culture=neutral, PublicKeyToken=71e9bce111e9429c</Assembly>
-    <Class>Microsoft.Office.DocumentManagement.Internal.DocIdHandler</Class>
-    <Data/>
-    <Filter/>
-  </Receiver>
-  <Receiver>
-    <Name>Document ID Generator</Name>
-    <Synchronization>Synchronous</Synchronization>
-    <Type>10004</Type>
-    <SequenceNumber>1002</SequenceNumber>
-    <Assembly>Microsoft.Office.DocumentManagement, Version=14.0.0.0, Culture=neutral, PublicKeyToken=71e9bce111e9429c</Assembly>
-    <Class>Microsoft.Office.DocumentManagement.Internal.DocIdHandler</Class>
-    <Data/>
-    <Filter/>
-  </Receiver>
-  <Receiver>
-    <Name>Document ID Generator</Name>
-    <Synchronization>Synchronous</Synchronization>
-    <Type>10006</Type>
-    <SequenceNumber>1003</SequenceNumber>
-    <Assembly>Microsoft.Office.DocumentManagement, Version=14.0.0.0, Culture=neutral, PublicKeyToken=71e9bce111e9429c</Assembly>
-    <Class>Microsoft.Office.DocumentManagement.Internal.DocIdHandler</Class>
-    <Data/>
-    <Filter/>
-  </Receiver>
-</spe:Receivers>
+<file path=customXml/itemProps1.xml><?xml version="1.0" encoding="utf-8"?>
+<ds:datastoreItem xmlns:ds="http://schemas.openxmlformats.org/officeDocument/2006/customXml" ds:itemID="{B13EBC30-FE27-4C6A-B723-23FC2188F7DC}">
+  <ds:schemaRefs>
+    <ds:schemaRef ds:uri="http://schemas.microsoft.com/sharepoint/events"/>
+  </ds:schemaRefs>
+</ds:datastoreItem>
 </file>
 
-<file path=customXml/itemProps1.xml><?xml version="1.0" encoding="utf-8"?>
+<file path=customXml/itemProps2.xml><?xml version="1.0" encoding="utf-8"?>
 <ds:datastoreItem xmlns:ds="http://schemas.openxmlformats.org/officeDocument/2006/customXml" ds:itemID="{5CDEB364-43EC-4510-9881-539C2A3FCE9E}">
   <ds:schemaRefs>
     <ds:schemaRef ds:uri="http://schemas.microsoft.com/sharepoint/v3/contenttype/forms"/>
@@ -15196,7 +16656,7 @@
 </ds:datastoreItem>
 </file>
 
-<file path=customXml/itemProps2.xml><?xml version="1.0" encoding="utf-8"?>
+<file path=customXml/itemProps3.xml><?xml version="1.0" encoding="utf-8"?>
 <ds:datastoreItem xmlns:ds="http://schemas.openxmlformats.org/officeDocument/2006/customXml" ds:itemID="{6921749B-AEB7-461B-845F-603CABD25259}">
   <ds:schemaRefs>
     <ds:schemaRef ds:uri="7bb5d761-a2ea-4873-95f7-7a6658fb3ef0"/>
@@ -15212,7 +16672,7 @@
 </ds:datastoreItem>
 </file>
 
-<file path=customXml/itemProps3.xml><?xml version="1.0" encoding="utf-8"?>
+<file path=customXml/itemProps4.xml><?xml version="1.0" encoding="utf-8"?>
 <ds:datastoreItem xmlns:ds="http://schemas.openxmlformats.org/officeDocument/2006/customXml" ds:itemID="{164479E5-0B02-49AC-B79E-EC1D6164DDD3}">
   <ds:schemaRefs>
     <ds:schemaRef ds:uri="http://schemas.microsoft.com/office/2006/metadata/contentType"/>
@@ -15228,12 +16688,4 @@
     <ds:schemaRef ds:uri="http://schemas.microsoft.com/internal/obd"/>
   </ds:schemaRefs>
 </ds:datastoreItem>
-</file>
-
-<file path=customXml/itemProps4.xml><?xml version="1.0" encoding="utf-8"?>
-<ds:datastoreItem xmlns:ds="http://schemas.openxmlformats.org/officeDocument/2006/customXml" ds:itemID="{B13EBC30-FE27-4C6A-B723-23FC2188F7DC}">
-  <ds:schemaRefs>
-    <ds:schemaRef ds:uri="http://schemas.microsoft.com/sharepoint/events"/>
-  </ds:schemaRefs>
-</ds:datastoreItem>
 </file>
</xml_diff>

<commit_message>
Fixes an error in the Creating an Ohai plugin section
The allow language is allow(subject).to receive. The space between
to and recieve is important.

Signed-off-by: Franklin Webber <franklin@chef.io>
</commit_message>
<xml_diff>
--- a/08-creating_ohai_plugins.pptx
+++ b/08-creating_ohai_plugins.pptx
@@ -174,7 +174,7 @@
   </p:defaultTextStyle>
   <p:extLst>
     <p:ext uri="{EFAFB233-063F-42B5-8137-9DF3F51BA10A}">
-      <p15:sldGuideLst xmlns="" xmlns:p15="http://schemas.microsoft.com/office/powerpoint/2012/main">
+      <p15:sldGuideLst xmlns:p15="http://schemas.microsoft.com/office/powerpoint/2012/main">
         <p15:guide id="1" orient="horz" pos="1392" userDrawn="1">
           <p15:clr>
             <a:srgbClr val="A4A3A4"/>
@@ -188,7 +188,7 @@
       </p15:sldGuideLst>
     </p:ext>
     <p:ext uri="{2D200454-40CA-4A62-9FC3-DE9A4176ACB9}">
-      <p15:notesGuideLst xmlns="" xmlns:p15="http://schemas.microsoft.com/office/powerpoint/2012/main"/>
+      <p15:notesGuideLst xmlns:p15="http://schemas.microsoft.com/office/powerpoint/2012/main"/>
     </p:ext>
   </p:extLst>
 </p:presentation>
@@ -305,7 +305,7 @@
               <a:pPr>
                 <a:defRPr/>
               </a:pPr>
-              <a:t>10/13/16</a:t>
+              <a:t>2016-12-02</a:t>
             </a:fld>
             <a:endParaRPr lang="en-US" dirty="0"/>
           </a:p>
@@ -488,7 +488,7 @@
               <a:pPr>
                 <a:defRPr/>
               </a:pPr>
-              <a:t>10/13/16</a:t>
+              <a:t>2016-12-02</a:t>
             </a:fld>
             <a:endParaRPr lang="en-US" dirty="0"/>
           </a:p>
@@ -1298,7 +1298,7 @@
   <p:clrMapOvr>
     <a:masterClrMapping/>
   </p:clrMapOvr>
-  <p:transition xmlns:p14="http://schemas.microsoft.com/office/powerpoint/2010/main" spd="med">
+  <p:transition spd="med">
     <p:fade/>
   </p:transition>
 </p:sldLayout>
@@ -1593,7 +1593,7 @@
   <p:clrMapOvr>
     <a:overrideClrMapping bg1="lt1" tx1="dk1" bg2="lt2" tx2="dk2" accent1="accent1" accent2="accent2" accent3="accent3" accent4="accent4" accent5="accent5" accent6="accent6" hlink="hlink" folHlink="folHlink"/>
   </p:clrMapOvr>
-  <p:transition xmlns:p14="http://schemas.microsoft.com/office/powerpoint/2010/main" spd="med">
+  <p:transition spd="med">
     <p:fade/>
   </p:transition>
 </p:sldLayout>
@@ -1726,14 +1726,14 @@
           </a:ln>
           <a:extLst>
             <a:ext uri="{909E8E84-426E-40dd-AFC4-6F175D3DCCD1}">
-              <a14:hiddenFill xmlns:a14="http://schemas.microsoft.com/office/drawing/2010/main">
+              <a14:hiddenFill xmlns:a14="http://schemas.microsoft.com/office/drawing/2010/main" xmlns="">
                 <a:solidFill>
                   <a:srgbClr val="FFFFFF"/>
                 </a:solidFill>
               </a14:hiddenFill>
             </a:ext>
             <a:ext uri="{91240B29-F687-4f45-9708-019B960494DF}">
-              <a14:hiddenLine xmlns:a14="http://schemas.microsoft.com/office/drawing/2010/main" w="9525">
+              <a14:hiddenLine xmlns:a14="http://schemas.microsoft.com/office/drawing/2010/main" xmlns="" w="9525">
                 <a:solidFill>
                   <a:srgbClr val="000000"/>
                 </a:solidFill>
@@ -1881,14 +1881,14 @@
           </a:ln>
           <a:extLst>
             <a:ext uri="{909E8E84-426E-40dd-AFC4-6F175D3DCCD1}">
-              <a14:hiddenFill xmlns:a14="http://schemas.microsoft.com/office/drawing/2010/main">
+              <a14:hiddenFill xmlns:a14="http://schemas.microsoft.com/office/drawing/2010/main" xmlns="">
                 <a:solidFill>
                   <a:srgbClr val="FFFFFF"/>
                 </a:solidFill>
               </a14:hiddenFill>
             </a:ext>
             <a:ext uri="{91240B29-F687-4f45-9708-019B960494DF}">
-              <a14:hiddenLine xmlns:a14="http://schemas.microsoft.com/office/drawing/2010/main" w="9525">
+              <a14:hiddenLine xmlns:a14="http://schemas.microsoft.com/office/drawing/2010/main" xmlns="" w="9525">
                 <a:solidFill>
                   <a:srgbClr val="000000"/>
                 </a:solidFill>
@@ -2286,7 +2286,7 @@
   <p:clrMapOvr>
     <a:overrideClrMapping bg1="lt1" tx1="dk1" bg2="lt2" tx2="dk2" accent1="accent1" accent2="accent2" accent3="accent3" accent4="accent4" accent5="accent5" accent6="accent6" hlink="hlink" folHlink="folHlink"/>
   </p:clrMapOvr>
-  <p:transition xmlns:p14="http://schemas.microsoft.com/office/powerpoint/2010/main" spd="med">
+  <p:transition spd="med">
     <p:fade/>
   </p:transition>
 </p:sldLayout>
@@ -2379,14 +2379,14 @@
           </a:ln>
           <a:extLst>
             <a:ext uri="{909E8E84-426E-40dd-AFC4-6F175D3DCCD1}">
-              <a14:hiddenFill xmlns:a14="http://schemas.microsoft.com/office/drawing/2010/main">
+              <a14:hiddenFill xmlns:a14="http://schemas.microsoft.com/office/drawing/2010/main" xmlns="">
                 <a:solidFill>
                   <a:srgbClr val="FFFFFF"/>
                 </a:solidFill>
               </a14:hiddenFill>
             </a:ext>
             <a:ext uri="{91240B29-F687-4f45-9708-019B960494DF}">
-              <a14:hiddenLine xmlns:a14="http://schemas.microsoft.com/office/drawing/2010/main" w="9525">
+              <a14:hiddenLine xmlns:a14="http://schemas.microsoft.com/office/drawing/2010/main" xmlns="" w="9525">
                 <a:solidFill>
                   <a:srgbClr val="000000"/>
                 </a:solidFill>
@@ -2408,7 +2408,7 @@
   <p:clrMapOvr>
     <a:masterClrMapping/>
   </p:clrMapOvr>
-  <p:transition xmlns:p14="http://schemas.microsoft.com/office/powerpoint/2010/main" spd="med">
+  <p:transition spd="med">
     <p:fade/>
   </p:transition>
 </p:sldLayout>
@@ -2695,7 +2695,7 @@
   <p:clrMapOvr>
     <a:masterClrMapping/>
   </p:clrMapOvr>
-  <p:transition xmlns:p14="http://schemas.microsoft.com/office/powerpoint/2010/main" spd="med">
+  <p:transition spd="med">
     <p:fade/>
   </p:transition>
 </p:sldLayout>
@@ -2982,7 +2982,7 @@
   <p:clrMapOvr>
     <a:masterClrMapping/>
   </p:clrMapOvr>
-  <p:transition xmlns:p14="http://schemas.microsoft.com/office/powerpoint/2010/main" spd="med">
+  <p:transition spd="med">
     <p:fade/>
   </p:transition>
 </p:sldLayout>
@@ -3331,7 +3331,7 @@
   <p:clrMapOvr>
     <a:masterClrMapping/>
   </p:clrMapOvr>
-  <p:transition xmlns:p14="http://schemas.microsoft.com/office/powerpoint/2010/main" spd="med">
+  <p:transition spd="med">
     <p:fade/>
   </p:transition>
 </p:sldLayout>
@@ -3618,7 +3618,7 @@
   <p:clrMapOvr>
     <a:masterClrMapping/>
   </p:clrMapOvr>
-  <p:transition xmlns:p14="http://schemas.microsoft.com/office/powerpoint/2010/main" spd="med">
+  <p:transition spd="med">
     <p:fade/>
   </p:transition>
 </p:sldLayout>
@@ -3835,14 +3835,14 @@
           </a:ln>
           <a:extLst>
             <a:ext uri="{909E8E84-426E-40dd-AFC4-6F175D3DCCD1}">
-              <a14:hiddenFill xmlns:a14="http://schemas.microsoft.com/office/drawing/2010/main">
+              <a14:hiddenFill xmlns:a14="http://schemas.microsoft.com/office/drawing/2010/main" xmlns="">
                 <a:solidFill>
                   <a:srgbClr val="FFFFFF"/>
                 </a:solidFill>
               </a14:hiddenFill>
             </a:ext>
             <a:ext uri="{91240B29-F687-4f45-9708-019B960494DF}">
-              <a14:hiddenLine xmlns:a14="http://schemas.microsoft.com/office/drawing/2010/main" w="9525">
+              <a14:hiddenLine xmlns:a14="http://schemas.microsoft.com/office/drawing/2010/main" xmlns="" w="9525">
                 <a:solidFill>
                   <a:srgbClr val="000000"/>
                 </a:solidFill>
@@ -4039,7 +4039,7 @@
   <p:clrMapOvr>
     <a:masterClrMapping/>
   </p:clrMapOvr>
-  <p:transition xmlns:p14="http://schemas.microsoft.com/office/powerpoint/2010/main" spd="med">
+  <p:transition spd="med">
     <p:fade/>
   </p:transition>
 </p:sldLayout>
@@ -4327,7 +4327,7 @@
   <p:clrMapOvr>
     <a:masterClrMapping/>
   </p:clrMapOvr>
-  <p:transition xmlns:p14="http://schemas.microsoft.com/office/powerpoint/2010/main" spd="med">
+  <p:transition spd="med">
     <p:fade/>
   </p:transition>
 </p:sldLayout>
@@ -4639,7 +4639,7 @@
   <p:clrMapOvr>
     <a:masterClrMapping/>
   </p:clrMapOvr>
-  <p:transition xmlns:p14="http://schemas.microsoft.com/office/powerpoint/2010/main" spd="med">
+  <p:transition spd="med">
     <p:fade/>
   </p:transition>
 </p:sldLayout>
@@ -4816,7 +4816,7 @@
   <p:clrMapOvr>
     <a:masterClrMapping/>
   </p:clrMapOvr>
-  <p:transition xmlns:p14="http://schemas.microsoft.com/office/powerpoint/2010/main" spd="med">
+  <p:transition spd="med">
     <p:fade/>
   </p:transition>
 </p:sldLayout>
@@ -5120,7 +5120,7 @@
   <p:clrMapOvr>
     <a:masterClrMapping/>
   </p:clrMapOvr>
-  <p:transition xmlns:p14="http://schemas.microsoft.com/office/powerpoint/2010/main" spd="med">
+  <p:transition spd="med">
     <p:fade/>
   </p:transition>
 </p:sldLayout>
@@ -5196,14 +5196,14 @@
           </a:ln>
           <a:extLst>
             <a:ext uri="{909E8E84-426E-40dd-AFC4-6F175D3DCCD1}">
-              <a14:hiddenFill xmlns:a14="http://schemas.microsoft.com/office/drawing/2010/main">
+              <a14:hiddenFill xmlns:a14="http://schemas.microsoft.com/office/drawing/2010/main" xmlns="">
                 <a:solidFill>
                   <a:srgbClr val="FFFFFF"/>
                 </a:solidFill>
               </a14:hiddenFill>
             </a:ext>
             <a:ext uri="{91240B29-F687-4f45-9708-019B960494DF}">
-              <a14:hiddenLine xmlns:a14="http://schemas.microsoft.com/office/drawing/2010/main" w="9525">
+              <a14:hiddenLine xmlns:a14="http://schemas.microsoft.com/office/drawing/2010/main" xmlns="" w="9525">
                 <a:solidFill>
                   <a:srgbClr val="000000"/>
                 </a:solidFill>
@@ -5479,7 +5479,7 @@
   <p:clrMapOvr>
     <a:overrideClrMapping bg1="lt1" tx1="dk1" bg2="lt2" tx2="dk2" accent1="accent1" accent2="accent2" accent3="accent3" accent4="accent4" accent5="accent5" accent6="accent6" hlink="hlink" folHlink="folHlink"/>
   </p:clrMapOvr>
-  <p:transition xmlns:p14="http://schemas.microsoft.com/office/powerpoint/2010/main" spd="med">
+  <p:transition spd="med">
     <p:fade/>
   </p:transition>
 </p:sldLayout>
@@ -5685,7 +5685,7 @@
   <p:clrMapOvr>
     <a:overrideClrMapping bg1="lt1" tx1="dk1" bg2="lt2" tx2="dk2" accent1="accent1" accent2="accent2" accent3="accent3" accent4="accent4" accent5="accent5" accent6="accent6" hlink="hlink" folHlink="folHlink"/>
   </p:clrMapOvr>
-  <p:transition xmlns:p14="http://schemas.microsoft.com/office/powerpoint/2010/main" spd="med">
+  <p:transition spd="med">
     <p:fade/>
   </p:transition>
 </p:sldLayout>
@@ -5761,14 +5761,14 @@
           </a:ln>
           <a:extLst>
             <a:ext uri="{909E8E84-426E-40dd-AFC4-6F175D3DCCD1}">
-              <a14:hiddenFill xmlns:a14="http://schemas.microsoft.com/office/drawing/2010/main">
+              <a14:hiddenFill xmlns:a14="http://schemas.microsoft.com/office/drawing/2010/main" xmlns="">
                 <a:solidFill>
                   <a:srgbClr val="FFFFFF"/>
                 </a:solidFill>
               </a14:hiddenFill>
             </a:ext>
             <a:ext uri="{91240B29-F687-4f45-9708-019B960494DF}">
-              <a14:hiddenLine xmlns:a14="http://schemas.microsoft.com/office/drawing/2010/main" w="9525">
+              <a14:hiddenLine xmlns:a14="http://schemas.microsoft.com/office/drawing/2010/main" xmlns="" w="9525">
                 <a:solidFill>
                   <a:srgbClr val="000000"/>
                 </a:solidFill>
@@ -6051,7 +6051,7 @@
   <p:clrMapOvr>
     <a:overrideClrMapping bg1="lt1" tx1="dk1" bg2="lt2" tx2="dk2" accent1="accent1" accent2="accent2" accent3="accent3" accent4="accent4" accent5="accent5" accent6="accent6" hlink="hlink" folHlink="folHlink"/>
   </p:clrMapOvr>
-  <p:transition xmlns:p14="http://schemas.microsoft.com/office/powerpoint/2010/main" spd="med">
+  <p:transition spd="med">
     <p:fade/>
   </p:transition>
 </p:sldLayout>
@@ -6259,7 +6259,7 @@
   <p:clrMapOvr>
     <a:overrideClrMapping bg1="lt1" tx1="dk1" bg2="lt2" tx2="dk2" accent1="accent1" accent2="accent2" accent3="accent3" accent4="accent4" accent5="accent5" accent6="accent6" hlink="hlink" folHlink="folHlink"/>
   </p:clrMapOvr>
-  <p:transition xmlns:p14="http://schemas.microsoft.com/office/powerpoint/2010/main" spd="med">
+  <p:transition spd="med">
     <p:fade/>
   </p:transition>
 </p:sldLayout>
@@ -6335,14 +6335,14 @@
           </a:ln>
           <a:extLst>
             <a:ext uri="{909E8E84-426E-40dd-AFC4-6F175D3DCCD1}">
-              <a14:hiddenFill xmlns:a14="http://schemas.microsoft.com/office/drawing/2010/main">
+              <a14:hiddenFill xmlns:a14="http://schemas.microsoft.com/office/drawing/2010/main" xmlns="">
                 <a:solidFill>
                   <a:srgbClr val="FFFFFF"/>
                 </a:solidFill>
               </a14:hiddenFill>
             </a:ext>
             <a:ext uri="{91240B29-F687-4f45-9708-019B960494DF}">
-              <a14:hiddenLine xmlns:a14="http://schemas.microsoft.com/office/drawing/2010/main" w="9525">
+              <a14:hiddenLine xmlns:a14="http://schemas.microsoft.com/office/drawing/2010/main" xmlns="" w="9525">
                 <a:solidFill>
                   <a:srgbClr val="000000"/>
                 </a:solidFill>
@@ -6610,7 +6610,7 @@
   <p:clrMapOvr>
     <a:overrideClrMapping bg1="lt1" tx1="dk1" bg2="lt2" tx2="dk2" accent1="accent1" accent2="accent2" accent3="accent3" accent4="accent4" accent5="accent5" accent6="accent6" hlink="hlink" folHlink="folHlink"/>
   </p:clrMapOvr>
-  <p:transition xmlns:p14="http://schemas.microsoft.com/office/powerpoint/2010/main" spd="med">
+  <p:transition spd="med">
     <p:fade/>
   </p:transition>
 </p:sldLayout>
@@ -6838,7 +6838,7 @@
   <p:clrMapOvr>
     <a:overrideClrMapping bg1="lt1" tx1="dk1" bg2="lt2" tx2="dk2" accent1="accent1" accent2="accent2" accent3="accent3" accent4="accent4" accent5="accent5" accent6="accent6" hlink="hlink" folHlink="folHlink"/>
   </p:clrMapOvr>
-  <p:transition xmlns:p14="http://schemas.microsoft.com/office/powerpoint/2010/main" spd="med">
+  <p:transition spd="med">
     <p:fade/>
   </p:transition>
 </p:sldLayout>
@@ -7126,7 +7126,7 @@
   <p:clrMapOvr>
     <a:overrideClrMapping bg1="lt1" tx1="dk1" bg2="lt2" tx2="dk2" accent1="accent1" accent2="accent2" accent3="accent3" accent4="accent4" accent5="accent5" accent6="accent6" hlink="hlink" folHlink="folHlink"/>
   </p:clrMapOvr>
-  <p:transition xmlns:p14="http://schemas.microsoft.com/office/powerpoint/2010/main" spd="med">
+  <p:transition spd="med">
     <p:fade/>
   </p:transition>
 </p:sldLayout>
@@ -7282,14 +7282,14 @@
           </a:ln>
           <a:extLst>
             <a:ext uri="{909E8E84-426E-40dd-AFC4-6F175D3DCCD1}">
-              <a14:hiddenFill xmlns:a14="http://schemas.microsoft.com/office/drawing/2010/main">
+              <a14:hiddenFill xmlns:a14="http://schemas.microsoft.com/office/drawing/2010/main" xmlns="">
                 <a:solidFill>
                   <a:srgbClr val="FFFFFF"/>
                 </a:solidFill>
               </a14:hiddenFill>
             </a:ext>
             <a:ext uri="{91240B29-F687-4f45-9708-019B960494DF}">
-              <a14:hiddenLine xmlns:a14="http://schemas.microsoft.com/office/drawing/2010/main" w="9525">
+              <a14:hiddenLine xmlns:a14="http://schemas.microsoft.com/office/drawing/2010/main" xmlns="" w="9525">
                 <a:solidFill>
                   <a:srgbClr val="000000"/>
                 </a:solidFill>
@@ -7506,13 +7506,13 @@
     <p:sldLayoutId id="2147483841" r:id="rId11"/>
     <p:sldLayoutId id="2147483843" r:id="rId12"/>
   </p:sldLayoutIdLst>
-  <p:transition xmlns:p14="http://schemas.microsoft.com/office/powerpoint/2010/main" spd="med">
+  <p:transition spd="med">
     <p:fade/>
   </p:transition>
   <p:timing>
     <p:tnLst>
       <p:par>
-        <p:cTn xmlns:p14="http://schemas.microsoft.com/office/powerpoint/2010/main" id="1" dur="indefinite" restart="never" nodeType="tmRoot"/>
+        <p:cTn id="1" dur="indefinite" restart="never" nodeType="tmRoot"/>
       </p:par>
     </p:tnLst>
   </p:timing>
@@ -8040,14 +8040,14 @@
           </a:ln>
           <a:extLst>
             <a:ext uri="{909E8E84-426E-40dd-AFC4-6F175D3DCCD1}">
-              <a14:hiddenFill xmlns:a14="http://schemas.microsoft.com/office/drawing/2010/main">
+              <a14:hiddenFill xmlns:a14="http://schemas.microsoft.com/office/drawing/2010/main" xmlns="">
                 <a:solidFill>
                   <a:srgbClr val="FFFFFF"/>
                 </a:solidFill>
               </a14:hiddenFill>
             </a:ext>
             <a:ext uri="{91240B29-F687-4f45-9708-019B960494DF}">
-              <a14:hiddenLine xmlns:a14="http://schemas.microsoft.com/office/drawing/2010/main" w="9525">
+              <a14:hiddenLine xmlns:a14="http://schemas.microsoft.com/office/drawing/2010/main" xmlns="" w="9525">
                 <a:solidFill>
                   <a:srgbClr val="000000"/>
                 </a:solidFill>
@@ -8335,13 +8335,13 @@
     <p:sldLayoutId id="2147483856" r:id="rId7"/>
     <p:sldLayoutId id="2147483866" r:id="rId8"/>
   </p:sldLayoutIdLst>
-  <p:transition xmlns:p14="http://schemas.microsoft.com/office/powerpoint/2010/main" spd="med">
+  <p:transition spd="med">
     <p:fade/>
   </p:transition>
   <p:timing>
     <p:tnLst>
       <p:par>
-        <p:cTn xmlns:p14="http://schemas.microsoft.com/office/powerpoint/2010/main" id="1" dur="indefinite" restart="never" nodeType="tmRoot"/>
+        <p:cTn id="1" dur="indefinite" restart="never" nodeType="tmRoot"/>
       </p:par>
     </p:tnLst>
   </p:timing>
@@ -8843,13 +8843,13 @@
   <p:clrMapOvr>
     <a:masterClrMapping/>
   </p:clrMapOvr>
-  <p:transition xmlns:p14="http://schemas.microsoft.com/office/powerpoint/2010/main" spd="med">
+  <p:transition spd="med">
     <p:fade/>
   </p:transition>
   <p:timing>
     <p:tnLst>
       <p:par>
-        <p:cTn xmlns:p14="http://schemas.microsoft.com/office/powerpoint/2010/main" id="1" dur="indefinite" restart="never" nodeType="tmRoot"/>
+        <p:cTn id="1" dur="indefinite" restart="never" nodeType="tmRoot"/>
       </p:par>
     </p:tnLst>
   </p:timing>
@@ -9101,13 +9101,13 @@
   <p:clrMapOvr>
     <a:masterClrMapping/>
   </p:clrMapOvr>
-  <p:transition xmlns:p14="http://schemas.microsoft.com/office/powerpoint/2010/main" spd="med">
+  <p:transition spd="med">
     <p:fade/>
   </p:transition>
   <p:timing>
     <p:tnLst>
       <p:par>
-        <p:cTn xmlns:p14="http://schemas.microsoft.com/office/powerpoint/2010/main" id="1" dur="indefinite" restart="never" nodeType="tmRoot"/>
+        <p:cTn id="1" dur="indefinite" restart="never" nodeType="tmRoot"/>
       </p:par>
     </p:tnLst>
   </p:timing>
@@ -9239,13 +9239,13 @@
   <p:clrMapOvr>
     <a:masterClrMapping/>
   </p:clrMapOvr>
-  <p:transition xmlns:p14="http://schemas.microsoft.com/office/powerpoint/2010/main" spd="med">
+  <p:transition spd="med">
     <p:fade/>
   </p:transition>
   <p:timing>
     <p:tnLst>
       <p:par>
-        <p:cTn xmlns:p14="http://schemas.microsoft.com/office/powerpoint/2010/main" id="1" dur="indefinite" restart="never" nodeType="tmRoot"/>
+        <p:cTn id="1" dur="indefinite" restart="never" nodeType="tmRoot"/>
       </p:par>
     </p:tnLst>
   </p:timing>
@@ -9378,13 +9378,13 @@
   <p:clrMapOvr>
     <a:masterClrMapping/>
   </p:clrMapOvr>
-  <p:transition xmlns:p14="http://schemas.microsoft.com/office/powerpoint/2010/main" spd="med">
+  <p:transition spd="med">
     <p:fade/>
   </p:transition>
   <p:timing>
     <p:tnLst>
       <p:par>
-        <p:cTn xmlns:p14="http://schemas.microsoft.com/office/powerpoint/2010/main" id="1" dur="indefinite" restart="never" nodeType="tmRoot"/>
+        <p:cTn id="1" dur="indefinite" restart="never" nodeType="tmRoot"/>
       </p:par>
     </p:tnLst>
   </p:timing>
@@ -9543,11 +9543,15 @@
           <a:p>
             <a:r>
               <a:rPr lang="en-US" b="1" dirty="0" smtClean="0"/>
-              <a:t>    allow(plugin).</a:t>
-            </a:r>
-            <a:r>
-              <a:rPr lang="en-US" b="1" dirty="0" err="1" smtClean="0"/>
-              <a:t>to_receive</a:t>
+              <a:t>    allow(plugin</a:t>
+            </a:r>
+            <a:r>
+              <a:rPr lang="en-US" b="1" smtClean="0"/>
+              <a:t>).</a:t>
+            </a:r>
+            <a:r>
+              <a:rPr lang="en-US" b="1" smtClean="0"/>
+              <a:t>to receive</a:t>
             </a:r>
             <a:r>
               <a:rPr lang="en-US" b="1" dirty="0" smtClean="0"/>
@@ -9579,9 +9583,16 @@
             </a:r>
             <a:r>
               <a:rPr lang="en-US" b="1" dirty="0" smtClean="0"/>
-              <a:t>('OUTPUT')</a:t>
-            </a:r>
-            <a:endParaRPr lang="en-US" b="1" dirty="0" smtClean="0"/>
+              <a:t>(double(</a:t>
+            </a:r>
+            <a:r>
+              <a:rPr lang="en-US" b="1" dirty="0" err="1" smtClean="0"/>
+              <a:t>stdout</a:t>
+            </a:r>
+            <a:r>
+              <a:rPr lang="en-US" b="1" dirty="0" smtClean="0"/>
+              <a:t>: 'OUTPUT'))</a:t>
+            </a:r>
           </a:p>
           <a:p>
             <a:r>
@@ -9601,12 +9612,12 @@
               <a:t>('apache/modules')).to </a:t>
             </a:r>
             <a:r>
-              <a:rPr lang="en-US" b="1" dirty="0" err="1"/>
+              <a:rPr lang="en-US" b="1" dirty="0" err="1" smtClean="0"/>
               <a:t>eq</a:t>
             </a:r>
             <a:r>
               <a:rPr lang="en-US" b="1" dirty="0" smtClean="0"/>
-              <a:t>("OUTPUT")</a:t>
+              <a:t>('OUTPUT')</a:t>
             </a:r>
             <a:endParaRPr lang="en-US" b="1" dirty="0"/>
           </a:p>
@@ -9697,13 +9708,13 @@
   <p:clrMapOvr>
     <a:masterClrMapping/>
   </p:clrMapOvr>
-  <p:transition xmlns:p14="http://schemas.microsoft.com/office/powerpoint/2010/main" spd="med">
+  <p:transition spd="med">
     <p:fade/>
   </p:transition>
   <p:timing>
     <p:tnLst>
       <p:par>
-        <p:cTn xmlns:p14="http://schemas.microsoft.com/office/powerpoint/2010/main" id="1" dur="indefinite" restart="never" nodeType="tmRoot"/>
+        <p:cTn id="1" dur="indefinite" restart="never" nodeType="tmRoot"/>
       </p:par>
     </p:tnLst>
   </p:timing>
@@ -9909,13 +9920,13 @@
   <p:clrMapOvr>
     <a:masterClrMapping/>
   </p:clrMapOvr>
-  <p:transition xmlns:p14="http://schemas.microsoft.com/office/powerpoint/2010/main" spd="med">
+  <p:transition spd="med">
     <p:fade/>
   </p:transition>
   <p:timing>
     <p:tnLst>
       <p:par>
-        <p:cTn xmlns:p14="http://schemas.microsoft.com/office/powerpoint/2010/main" id="1" dur="indefinite" restart="never" nodeType="tmRoot"/>
+        <p:cTn id="1" dur="indefinite" restart="never" nodeType="tmRoot"/>
       </p:par>
     </p:tnLst>
   </p:timing>
@@ -10011,12 +10022,16 @@
           </a:p>
           <a:p>
             <a:r>
-              <a:rPr lang="en-US" b="1" dirty="0"/>
-              <a:t>    apache </a:t>
-            </a:r>
-            <a:r>
-              <a:rPr lang="en-US" b="1" dirty="0" err="1"/>
+              <a:rPr lang="en-US" b="1" dirty="0" smtClean="0"/>
+              <a:t>    apache(</a:t>
+            </a:r>
+            <a:r>
+              <a:rPr lang="en-US" b="1" dirty="0" err="1" smtClean="0"/>
               <a:t>Mash.new</a:t>
+            </a:r>
+            <a:r>
+              <a:rPr lang="en-US" b="1" dirty="0" smtClean="0"/>
+              <a:t>)</a:t>
             </a:r>
             <a:endParaRPr lang="en-US" b="1" dirty="0"/>
           </a:p>
@@ -10147,13 +10162,13 @@
   <p:clrMapOvr>
     <a:masterClrMapping/>
   </p:clrMapOvr>
-  <p:transition xmlns:p14="http://schemas.microsoft.com/office/powerpoint/2010/main" spd="med">
+  <p:transition spd="med">
     <p:fade/>
   </p:transition>
   <p:timing>
     <p:tnLst>
       <p:par>
-        <p:cTn xmlns:p14="http://schemas.microsoft.com/office/powerpoint/2010/main" id="1" dur="indefinite" restart="never" nodeType="tmRoot"/>
+        <p:cTn id="1" dur="indefinite" restart="never" nodeType="tmRoot"/>
       </p:par>
     </p:tnLst>
   </p:timing>
@@ -10300,13 +10315,13 @@
   <p:clrMapOvr>
     <a:masterClrMapping/>
   </p:clrMapOvr>
-  <p:transition xmlns:p14="http://schemas.microsoft.com/office/powerpoint/2010/main" spd="med">
+  <p:transition spd="med">
     <p:fade/>
   </p:transition>
   <p:timing>
     <p:tnLst>
       <p:par>
-        <p:cTn xmlns:p14="http://schemas.microsoft.com/office/powerpoint/2010/main" id="1" dur="indefinite" restart="never" nodeType="tmRoot"/>
+        <p:cTn id="1" dur="indefinite" restart="never" nodeType="tmRoot"/>
       </p:par>
     </p:tnLst>
   </p:timing>
@@ -10499,13 +10514,13 @@
   <p:clrMapOvr>
     <a:masterClrMapping/>
   </p:clrMapOvr>
-  <p:transition xmlns:p14="http://schemas.microsoft.com/office/powerpoint/2010/main" spd="med">
+  <p:transition spd="med">
     <p:fade/>
   </p:transition>
   <p:timing>
     <p:tnLst>
       <p:par>
-        <p:cTn xmlns:p14="http://schemas.microsoft.com/office/powerpoint/2010/main" id="1" dur="indefinite" restart="never" nodeType="tmRoot"/>
+        <p:cTn id="1" dur="indefinite" restart="never" nodeType="tmRoot"/>
       </p:par>
     </p:tnLst>
   </p:timing>
@@ -10894,13 +10909,13 @@
   <p:clrMapOvr>
     <a:masterClrMapping/>
   </p:clrMapOvr>
-  <p:transition xmlns:p14="http://schemas.microsoft.com/office/powerpoint/2010/main" spd="med">
+  <p:transition spd="med">
     <p:fade/>
   </p:transition>
   <p:timing>
     <p:tnLst>
       <p:par>
-        <p:cTn xmlns:p14="http://schemas.microsoft.com/office/powerpoint/2010/main" id="1" dur="indefinite" restart="never" nodeType="tmRoot"/>
+        <p:cTn id="1" dur="indefinite" restart="never" nodeType="tmRoot"/>
       </p:par>
     </p:tnLst>
   </p:timing>
@@ -11148,13 +11163,13 @@
   <p:clrMapOvr>
     <a:masterClrMapping/>
   </p:clrMapOvr>
-  <p:transition xmlns:p14="http://schemas.microsoft.com/office/powerpoint/2010/main" spd="med">
+  <p:transition spd="med">
     <p:fade/>
   </p:transition>
   <p:timing>
     <p:tnLst>
       <p:par>
-        <p:cTn xmlns:p14="http://schemas.microsoft.com/office/powerpoint/2010/main" id="1" dur="indefinite" restart="never" nodeType="tmRoot"/>
+        <p:cTn id="1" dur="indefinite" restart="never" nodeType="tmRoot"/>
       </p:par>
     </p:tnLst>
   </p:timing>
@@ -11255,13 +11270,13 @@
   <p:clrMapOvr>
     <a:masterClrMapping/>
   </p:clrMapOvr>
-  <p:transition xmlns:p14="http://schemas.microsoft.com/office/powerpoint/2010/main" spd="med">
+  <p:transition spd="med">
     <p:fade/>
   </p:transition>
   <p:timing>
     <p:tnLst>
       <p:par>
-        <p:cTn xmlns:p14="http://schemas.microsoft.com/office/powerpoint/2010/main" id="1" dur="indefinite" restart="never" nodeType="tmRoot"/>
+        <p:cTn id="1" dur="indefinite" restart="never" nodeType="tmRoot"/>
       </p:par>
     </p:tnLst>
   </p:timing>
@@ -11589,13 +11604,13 @@
   <p:clrMapOvr>
     <a:masterClrMapping/>
   </p:clrMapOvr>
-  <p:transition xmlns:p14="http://schemas.microsoft.com/office/powerpoint/2010/main" spd="med">
+  <p:transition spd="med">
     <p:fade/>
   </p:transition>
   <p:timing>
     <p:tnLst>
       <p:par>
-        <p:cTn xmlns:p14="http://schemas.microsoft.com/office/powerpoint/2010/main" id="1" dur="indefinite" restart="never" nodeType="tmRoot"/>
+        <p:cTn id="1" dur="indefinite" restart="never" nodeType="tmRoot"/>
       </p:par>
     </p:tnLst>
   </p:timing>
@@ -11806,13 +11821,13 @@
   <p:clrMapOvr>
     <a:masterClrMapping/>
   </p:clrMapOvr>
-  <p:transition xmlns:p14="http://schemas.microsoft.com/office/powerpoint/2010/main" spd="med">
+  <p:transition spd="med">
     <p:fade/>
   </p:transition>
   <p:timing>
     <p:tnLst>
       <p:par>
-        <p:cTn xmlns:p14="http://schemas.microsoft.com/office/powerpoint/2010/main" id="1" dur="indefinite" restart="never" nodeType="tmRoot"/>
+        <p:cTn id="1" dur="indefinite" restart="never" nodeType="tmRoot"/>
       </p:par>
     </p:tnLst>
   </p:timing>
@@ -12005,13 +12020,13 @@
   <p:clrMapOvr>
     <a:masterClrMapping/>
   </p:clrMapOvr>
-  <p:transition xmlns:p14="http://schemas.microsoft.com/office/powerpoint/2010/main" spd="med">
+  <p:transition spd="med">
     <p:fade/>
   </p:transition>
   <p:timing>
     <p:tnLst>
       <p:par>
-        <p:cTn xmlns:p14="http://schemas.microsoft.com/office/powerpoint/2010/main" id="1" dur="indefinite" restart="never" nodeType="tmRoot"/>
+        <p:cTn id="1" dur="indefinite" restart="never" nodeType="tmRoot"/>
       </p:par>
     </p:tnLst>
   </p:timing>
@@ -12117,8 +12132,31 @@
           <a:p>
             <a:r>
               <a:rPr lang="en-US" b="1" dirty="0"/>
-              <a:t># Copyright (c) 2016 The Authors, All Rights Reserved.</a:t>
-            </a:r>
+              <a:t># Copyright (c) 2016 The Authors, All Rights Reserved</a:t>
+            </a:r>
+            <a:r>
+              <a:rPr lang="en-US" b="1" dirty="0" smtClean="0"/>
+              <a:t>.</a:t>
+            </a:r>
+          </a:p>
+          <a:p>
+            <a:r>
+              <a:rPr lang="en-US" b="1" dirty="0" err="1" smtClean="0"/>
+              <a:t>include_recipe</a:t>
+            </a:r>
+            <a:r>
+              <a:rPr lang="en-US" b="1" dirty="0" smtClean="0"/>
+              <a:t> '</a:t>
+            </a:r>
+            <a:r>
+              <a:rPr lang="en-US" b="1" dirty="0" err="1" smtClean="0"/>
+              <a:t>httpd</a:t>
+            </a:r>
+            <a:r>
+              <a:rPr lang="en-US" b="1" dirty="0" smtClean="0"/>
+              <a:t>::default'</a:t>
+            </a:r>
+            <a:endParaRPr lang="en-US" b="1" dirty="0"/>
           </a:p>
           <a:p>
             <a:r>
@@ -12188,7 +12226,7 @@
         <p:spPr>
           <a:xfrm>
             <a:off x="1135042" y="4766709"/>
-            <a:ext cx="14404273" cy="626533"/>
+            <a:ext cx="14404273" cy="1024491"/>
           </a:xfrm>
         </p:spPr>
         <p:txBody>
@@ -12209,13 +12247,13 @@
   <p:clrMapOvr>
     <a:masterClrMapping/>
   </p:clrMapOvr>
-  <p:transition xmlns:p14="http://schemas.microsoft.com/office/powerpoint/2010/main" spd="med">
+  <p:transition spd="med">
     <p:fade/>
   </p:transition>
   <p:timing>
     <p:tnLst>
       <p:par>
-        <p:cTn xmlns:p14="http://schemas.microsoft.com/office/powerpoint/2010/main" id="1" dur="indefinite" restart="never" nodeType="tmRoot"/>
+        <p:cTn id="1" dur="indefinite" restart="never" nodeType="tmRoot"/>
       </p:par>
     </p:tnLst>
   </p:timing>
@@ -12336,13 +12374,13 @@
   <p:clrMapOvr>
     <a:masterClrMapping/>
   </p:clrMapOvr>
-  <p:transition xmlns:p14="http://schemas.microsoft.com/office/powerpoint/2010/main" spd="med">
+  <p:transition spd="med">
     <p:fade/>
   </p:transition>
   <p:timing>
     <p:tnLst>
       <p:par>
-        <p:cTn xmlns:p14="http://schemas.microsoft.com/office/powerpoint/2010/main" id="1" dur="indefinite" restart="never" nodeType="tmRoot"/>
+        <p:cTn id="1" dur="indefinite" restart="never" nodeType="tmRoot"/>
       </p:par>
     </p:tnLst>
   </p:timing>
@@ -12537,13 +12575,13 @@
   <p:clrMapOvr>
     <a:masterClrMapping/>
   </p:clrMapOvr>
-  <p:transition xmlns:p14="http://schemas.microsoft.com/office/powerpoint/2010/main" spd="med">
+  <p:transition spd="med">
     <p:fade/>
   </p:transition>
   <p:timing>
     <p:tnLst>
       <p:par>
-        <p:cTn xmlns:p14="http://schemas.microsoft.com/office/powerpoint/2010/main" id="1" dur="indefinite" restart="never" nodeType="tmRoot"/>
+        <p:cTn id="1" dur="indefinite" restart="never" nodeType="tmRoot"/>
       </p:par>
     </p:tnLst>
   </p:timing>
@@ -12803,13 +12841,13 @@
   <p:clrMapOvr>
     <a:masterClrMapping/>
   </p:clrMapOvr>
-  <p:transition xmlns:p14="http://schemas.microsoft.com/office/powerpoint/2010/main" spd="med">
+  <p:transition spd="med">
     <p:fade/>
   </p:transition>
   <p:timing>
     <p:tnLst>
       <p:par>
-        <p:cTn xmlns:p14="http://schemas.microsoft.com/office/powerpoint/2010/main" id="1" dur="indefinite" restart="never" nodeType="tmRoot"/>
+        <p:cTn id="1" dur="indefinite" restart="never" nodeType="tmRoot"/>
       </p:par>
     </p:tnLst>
   </p:timing>
@@ -13058,13 +13096,13 @@
   <p:clrMapOvr>
     <a:masterClrMapping/>
   </p:clrMapOvr>
-  <p:transition xmlns:p14="http://schemas.microsoft.com/office/powerpoint/2010/main" spd="med">
+  <p:transition spd="med">
     <p:fade/>
   </p:transition>
   <p:timing>
     <p:tnLst>
       <p:par>
-        <p:cTn xmlns:p14="http://schemas.microsoft.com/office/powerpoint/2010/main" id="1" dur="indefinite" restart="never" nodeType="tmRoot"/>
+        <p:cTn id="1" dur="indefinite" restart="never" nodeType="tmRoot"/>
       </p:par>
     </p:tnLst>
   </p:timing>
@@ -13251,13 +13289,13 @@
   <p:clrMapOvr>
     <a:masterClrMapping/>
   </p:clrMapOvr>
-  <p:transition xmlns:p14="http://schemas.microsoft.com/office/powerpoint/2010/main" spd="med">
+  <p:transition spd="med">
     <p:fade/>
   </p:transition>
   <p:timing>
     <p:tnLst>
       <p:par>
-        <p:cTn xmlns:p14="http://schemas.microsoft.com/office/powerpoint/2010/main" id="1" dur="indefinite" restart="never" nodeType="tmRoot"/>
+        <p:cTn id="1" dur="indefinite" restart="never" nodeType="tmRoot"/>
       </p:par>
     </p:tnLst>
   </p:timing>
@@ -13499,13 +13537,13 @@
   <p:clrMapOvr>
     <a:masterClrMapping/>
   </p:clrMapOvr>
-  <p:transition xmlns:p14="http://schemas.microsoft.com/office/powerpoint/2010/main" spd="med">
+  <p:transition spd="med">
     <p:fade/>
   </p:transition>
   <p:timing>
     <p:tnLst>
       <p:par>
-        <p:cTn xmlns:p14="http://schemas.microsoft.com/office/powerpoint/2010/main" id="1" dur="indefinite" restart="never" nodeType="tmRoot"/>
+        <p:cTn id="1" dur="indefinite" restart="never" nodeType="tmRoot"/>
       </p:par>
     </p:tnLst>
   </p:timing>
@@ -13693,13 +13731,13 @@
   <p:clrMapOvr>
     <a:masterClrMapping/>
   </p:clrMapOvr>
-  <p:transition xmlns:p14="http://schemas.microsoft.com/office/powerpoint/2010/main" spd="med">
+  <p:transition spd="med">
     <p:fade/>
   </p:transition>
   <p:timing>
     <p:tnLst>
       <p:par>
-        <p:cTn xmlns:p14="http://schemas.microsoft.com/office/powerpoint/2010/main" id="1" dur="indefinite" restart="never" nodeType="tmRoot"/>
+        <p:cTn id="1" dur="indefinite" restart="never" nodeType="tmRoot"/>
       </p:par>
     </p:tnLst>
   </p:timing>
@@ -13892,13 +13930,13 @@
   <p:clrMapOvr>
     <a:masterClrMapping/>
   </p:clrMapOvr>
-  <p:transition xmlns:p14="http://schemas.microsoft.com/office/powerpoint/2010/main" spd="med">
+  <p:transition spd="med">
     <p:fade/>
   </p:transition>
   <p:timing>
     <p:tnLst>
       <p:par>
-        <p:cTn xmlns:p14="http://schemas.microsoft.com/office/powerpoint/2010/main" id="1" dur="indefinite" restart="never" nodeType="tmRoot"/>
+        <p:cTn id="1" dur="indefinite" restart="never" nodeType="tmRoot"/>
       </p:par>
     </p:tnLst>
   </p:timing>
@@ -13980,13 +14018,13 @@
   <p:clrMapOvr>
     <a:masterClrMapping/>
   </p:clrMapOvr>
-  <p:transition xmlns:p14="http://schemas.microsoft.com/office/powerpoint/2010/main" spd="med">
+  <p:transition spd="med">
     <p:fade/>
   </p:transition>
   <p:timing>
     <p:tnLst>
       <p:par>
-        <p:cTn xmlns:p14="http://schemas.microsoft.com/office/powerpoint/2010/main" id="1" dur="indefinite" restart="never" nodeType="tmRoot"/>
+        <p:cTn id="1" dur="indefinite" restart="never" nodeType="tmRoot"/>
       </p:par>
     </p:tnLst>
   </p:timing>
@@ -14020,13 +14058,13 @@
   <p:clrMapOvr>
     <a:masterClrMapping/>
   </p:clrMapOvr>
-  <p:transition xmlns:p14="http://schemas.microsoft.com/office/powerpoint/2010/main" spd="med">
+  <p:transition spd="med">
     <p:fade/>
   </p:transition>
   <p:timing>
     <p:tnLst>
       <p:par>
-        <p:cTn xmlns:p14="http://schemas.microsoft.com/office/powerpoint/2010/main" id="1" dur="indefinite" restart="never" nodeType="tmRoot"/>
+        <p:cTn id="1" dur="indefinite" restart="never" nodeType="tmRoot"/>
       </p:par>
     </p:tnLst>
   </p:timing>
@@ -14146,13 +14184,13 @@
   <p:clrMapOvr>
     <a:masterClrMapping/>
   </p:clrMapOvr>
-  <p:transition xmlns:p14="http://schemas.microsoft.com/office/powerpoint/2010/main" spd="med">
+  <p:transition spd="med">
     <p:fade/>
   </p:transition>
   <p:timing>
     <p:tnLst>
       <p:par>
-        <p:cTn xmlns:p14="http://schemas.microsoft.com/office/powerpoint/2010/main" id="1" dur="indefinite" restart="never" nodeType="tmRoot"/>
+        <p:cTn id="1" dur="indefinite" restart="never" nodeType="tmRoot"/>
       </p:par>
     </p:tnLst>
   </p:timing>
@@ -14345,13 +14383,13 @@
   <p:clrMapOvr>
     <a:masterClrMapping/>
   </p:clrMapOvr>
-  <p:transition xmlns:p14="http://schemas.microsoft.com/office/powerpoint/2010/main" spd="med">
+  <p:transition spd="med">
     <p:fade/>
   </p:transition>
   <p:timing>
     <p:tnLst>
       <p:par>
-        <p:cTn xmlns:p14="http://schemas.microsoft.com/office/powerpoint/2010/main" id="1" dur="indefinite" restart="never" nodeType="tmRoot"/>
+        <p:cTn id="1" dur="indefinite" restart="never" nodeType="tmRoot"/>
       </p:par>
     </p:tnLst>
   </p:timing>
@@ -14466,13 +14504,13 @@
   <p:clrMapOvr>
     <a:masterClrMapping/>
   </p:clrMapOvr>
-  <p:transition xmlns:p14="http://schemas.microsoft.com/office/powerpoint/2010/main" spd="med">
+  <p:transition spd="med">
     <p:fade/>
   </p:transition>
   <p:timing>
     <p:tnLst>
       <p:par>
-        <p:cTn xmlns:p14="http://schemas.microsoft.com/office/powerpoint/2010/main" id="1" dur="indefinite" restart="never" nodeType="tmRoot"/>
+        <p:cTn id="1" dur="indefinite" restart="never" nodeType="tmRoot"/>
       </p:par>
     </p:tnLst>
   </p:timing>
@@ -14666,13 +14704,13 @@
   <p:clrMapOvr>
     <a:masterClrMapping/>
   </p:clrMapOvr>
-  <p:transition xmlns:p14="http://schemas.microsoft.com/office/powerpoint/2010/main" spd="med">
+  <p:transition spd="med">
     <p:fade/>
   </p:transition>
   <p:timing>
     <p:tnLst>
       <p:par>
-        <p:cTn xmlns:p14="http://schemas.microsoft.com/office/powerpoint/2010/main" id="1" dur="indefinite" restart="never" nodeType="tmRoot"/>
+        <p:cTn id="1" dur="indefinite" restart="never" nodeType="tmRoot"/>
       </p:par>
     </p:tnLst>
   </p:timing>
@@ -14886,13 +14924,13 @@
   <p:clrMapOvr>
     <a:masterClrMapping/>
   </p:clrMapOvr>
-  <p:transition xmlns:p14="http://schemas.microsoft.com/office/powerpoint/2010/main" spd="med">
+  <p:transition spd="med">
     <p:fade/>
   </p:transition>
   <p:timing>
     <p:tnLst>
       <p:par>
-        <p:cTn xmlns:p14="http://schemas.microsoft.com/office/powerpoint/2010/main" id="1" dur="indefinite" restart="never" nodeType="tmRoot"/>
+        <p:cTn id="1" dur="indefinite" restart="never" nodeType="tmRoot"/>
       </p:par>
     </p:tnLst>
   </p:timing>
@@ -15085,13 +15123,13 @@
   <p:clrMapOvr>
     <a:masterClrMapping/>
   </p:clrMapOvr>
-  <p:transition xmlns:p14="http://schemas.microsoft.com/office/powerpoint/2010/main" spd="med">
+  <p:transition spd="med">
     <p:fade/>
   </p:transition>
   <p:timing>
     <p:tnLst>
       <p:par>
-        <p:cTn xmlns:p14="http://schemas.microsoft.com/office/powerpoint/2010/main" id="1" dur="indefinite" restart="never" nodeType="tmRoot"/>
+        <p:cTn id="1" dur="indefinite" restart="never" nodeType="tmRoot"/>
       </p:par>
     </p:tnLst>
   </p:timing>
@@ -15474,7 +15512,7 @@
   <a:extraClrSchemeLst/>
   <a:extLst>
     <a:ext uri="{05A4C25C-085E-4340-85A3-A5531E510DB2}">
-      <thm15:themeFamily xmlns="" xmlns:thm15="http://schemas.microsoft.com/office/thememl/2012/main" name="Chef-TemplateComps_v09-16x9-Light.potx" id="{078CEFDB-FA7A-4E36-9964-13EF367585CB}" vid="{8B87B0F3-7308-43D5-8388-E1B49EA02652}"/>
+      <thm15:themeFamily xmlns:thm15="http://schemas.microsoft.com/office/thememl/2012/main" name="Chef-TemplateComps_v09-16x9-Light.potx" id="{078CEFDB-FA7A-4E36-9964-13EF367585CB}" vid="{8B87B0F3-7308-43D5-8388-E1B49EA02652}"/>
     </a:ext>
   </a:extLst>
 </a:theme>
@@ -15856,7 +15894,7 @@
   <a:extraClrSchemeLst/>
   <a:extLst>
     <a:ext uri="{05A4C25C-085E-4340-85A3-A5531E510DB2}">
-      <thm15:themeFamily xmlns="" xmlns:thm15="http://schemas.microsoft.com/office/thememl/2012/main" name="Chef-TemplateComps_v09-16x9-Light.potx" id="{078CEFDB-FA7A-4E36-9964-13EF367585CB}" vid="{8B87B0F3-7308-43D5-8388-E1B49EA02652}"/>
+      <thm15:themeFamily xmlns:thm15="http://schemas.microsoft.com/office/thememl/2012/main" name="Chef-TemplateComps_v09-16x9-Light.potx" id="{078CEFDB-FA7A-4E36-9964-13EF367585CB}" vid="{8B87B0F3-7308-43D5-8388-E1B49EA02652}"/>
     </a:ext>
   </a:extLst>
 </a:theme>
@@ -16429,61 +16467,6 @@
 </file>
 
 <file path=customXml/item1.xml><?xml version="1.0" encoding="utf-8"?>
-<?mso-contentType ?>
-<spe:Receivers xmlns:spe="http://schemas.microsoft.com/sharepoint/events">
-  <Receiver>
-    <Name>Document ID Generator</Name>
-    <Synchronization>Synchronous</Synchronization>
-    <Type>10001</Type>
-    <SequenceNumber>1000</SequenceNumber>
-    <Assembly>Microsoft.Office.DocumentManagement, Version=14.0.0.0, Culture=neutral, PublicKeyToken=71e9bce111e9429c</Assembly>
-    <Class>Microsoft.Office.DocumentManagement.Internal.DocIdHandler</Class>
-    <Data/>
-    <Filter/>
-  </Receiver>
-  <Receiver>
-    <Name>Document ID Generator</Name>
-    <Synchronization>Synchronous</Synchronization>
-    <Type>10002</Type>
-    <SequenceNumber>1001</SequenceNumber>
-    <Assembly>Microsoft.Office.DocumentManagement, Version=14.0.0.0, Culture=neutral, PublicKeyToken=71e9bce111e9429c</Assembly>
-    <Class>Microsoft.Office.DocumentManagement.Internal.DocIdHandler</Class>
-    <Data/>
-    <Filter/>
-  </Receiver>
-  <Receiver>
-    <Name>Document ID Generator</Name>
-    <Synchronization>Synchronous</Synchronization>
-    <Type>10004</Type>
-    <SequenceNumber>1002</SequenceNumber>
-    <Assembly>Microsoft.Office.DocumentManagement, Version=14.0.0.0, Culture=neutral, PublicKeyToken=71e9bce111e9429c</Assembly>
-    <Class>Microsoft.Office.DocumentManagement.Internal.DocIdHandler</Class>
-    <Data/>
-    <Filter/>
-  </Receiver>
-  <Receiver>
-    <Name>Document ID Generator</Name>
-    <Synchronization>Synchronous</Synchronization>
-    <Type>10006</Type>
-    <SequenceNumber>1003</SequenceNumber>
-    <Assembly>Microsoft.Office.DocumentManagement, Version=14.0.0.0, Culture=neutral, PublicKeyToken=71e9bce111e9429c</Assembly>
-    <Class>Microsoft.Office.DocumentManagement.Internal.DocIdHandler</Class>
-    <Data/>
-    <Filter/>
-  </Receiver>
-</spe:Receivers>
-</file>
-
-<file path=customXml/item2.xml><?xml version="1.0" encoding="utf-8"?>
-<?mso-contentType ?>
-<FormTemplates xmlns="http://schemas.microsoft.com/sharepoint/v3/contenttype/forms">
-  <Display>DocumentLibraryForm</Display>
-  <Edit>DocumentLibraryForm</Edit>
-  <New>DocumentLibraryForm</New>
-</FormTemplates>
-</file>
-
-<file path=customXml/item3.xml><?xml version="1.0" encoding="utf-8"?>
 <p:properties xmlns:p="http://schemas.microsoft.com/office/2006/metadata/properties" xmlns:xsi="http://www.w3.org/2001/XMLSchema-instance" xmlns:pc="http://schemas.microsoft.com/office/infopath/2007/PartnerControls">
   <documentManagement>
     <_dlc_DocId xmlns="7bb5d761-a2ea-4873-95f7-7a6658fb3ef0">M4CWTKMW727E-592-73</_dlc_DocId>
@@ -16495,7 +16478,7 @@
 </p:properties>
 </file>
 
-<file path=customXml/item4.xml><?xml version="1.0" encoding="utf-8"?>
+<file path=customXml/item2.xml><?xml version="1.0" encoding="utf-8"?>
 <ct:contentTypeSchema xmlns:ct="http://schemas.microsoft.com/office/2006/metadata/contentType" xmlns:ma="http://schemas.microsoft.com/office/2006/metadata/properties/metaAttributes" ct:_="" ma:_="" ma:contentTypeName="Document" ma:contentTypeID="0x0101000812F700BE7F874999720E88173FE491" ma:contentTypeVersion="0" ma:contentTypeDescription="Create a new document." ma:contentTypeScope="" ma:versionID="3f79f408e2ca720b7aba6e0e32464d0c">
   <xsd:schema xmlns:xsd="http://www.w3.org/2001/XMLSchema" xmlns:xs="http://www.w3.org/2001/XMLSchema" xmlns:p="http://schemas.microsoft.com/office/2006/metadata/properties" xmlns:ns2="7bb5d761-a2ea-4873-95f7-7a6658fb3ef0" targetNamespace="http://schemas.microsoft.com/office/2006/metadata/properties" ma:root="true" ma:fieldsID="1e062cd38ba31e406bfc4340fbc7f87a" ns2:_="">
     <xsd:import namespace="7bb5d761-a2ea-4873-95f7-7a6658fb3ef0"/>
@@ -16640,23 +16623,62 @@
 </ct:contentTypeSchema>
 </file>
 
-<file path=customXml/itemProps1.xml><?xml version="1.0" encoding="utf-8"?>
-<ds:datastoreItem xmlns:ds="http://schemas.openxmlformats.org/officeDocument/2006/customXml" ds:itemID="{B13EBC30-FE27-4C6A-B723-23FC2188F7DC}">
-  <ds:schemaRefs>
-    <ds:schemaRef ds:uri="http://schemas.microsoft.com/sharepoint/events"/>
-  </ds:schemaRefs>
-</ds:datastoreItem>
+<file path=customXml/item3.xml><?xml version="1.0" encoding="utf-8"?>
+<?mso-contentType ?>
+<spe:Receivers xmlns:spe="http://schemas.microsoft.com/sharepoint/events">
+  <Receiver>
+    <Name>Document ID Generator</Name>
+    <Synchronization>Synchronous</Synchronization>
+    <Type>10001</Type>
+    <SequenceNumber>1000</SequenceNumber>
+    <Assembly>Microsoft.Office.DocumentManagement, Version=14.0.0.0, Culture=neutral, PublicKeyToken=71e9bce111e9429c</Assembly>
+    <Class>Microsoft.Office.DocumentManagement.Internal.DocIdHandler</Class>
+    <Data/>
+    <Filter/>
+  </Receiver>
+  <Receiver>
+    <Name>Document ID Generator</Name>
+    <Synchronization>Synchronous</Synchronization>
+    <Type>10002</Type>
+    <SequenceNumber>1001</SequenceNumber>
+    <Assembly>Microsoft.Office.DocumentManagement, Version=14.0.0.0, Culture=neutral, PublicKeyToken=71e9bce111e9429c</Assembly>
+    <Class>Microsoft.Office.DocumentManagement.Internal.DocIdHandler</Class>
+    <Data/>
+    <Filter/>
+  </Receiver>
+  <Receiver>
+    <Name>Document ID Generator</Name>
+    <Synchronization>Synchronous</Synchronization>
+    <Type>10004</Type>
+    <SequenceNumber>1002</SequenceNumber>
+    <Assembly>Microsoft.Office.DocumentManagement, Version=14.0.0.0, Culture=neutral, PublicKeyToken=71e9bce111e9429c</Assembly>
+    <Class>Microsoft.Office.DocumentManagement.Internal.DocIdHandler</Class>
+    <Data/>
+    <Filter/>
+  </Receiver>
+  <Receiver>
+    <Name>Document ID Generator</Name>
+    <Synchronization>Synchronous</Synchronization>
+    <Type>10006</Type>
+    <SequenceNumber>1003</SequenceNumber>
+    <Assembly>Microsoft.Office.DocumentManagement, Version=14.0.0.0, Culture=neutral, PublicKeyToken=71e9bce111e9429c</Assembly>
+    <Class>Microsoft.Office.DocumentManagement.Internal.DocIdHandler</Class>
+    <Data/>
+    <Filter/>
+  </Receiver>
+</spe:Receivers>
 </file>
 
-<file path=customXml/itemProps2.xml><?xml version="1.0" encoding="utf-8"?>
-<ds:datastoreItem xmlns:ds="http://schemas.openxmlformats.org/officeDocument/2006/customXml" ds:itemID="{5CDEB364-43EC-4510-9881-539C2A3FCE9E}">
-  <ds:schemaRefs>
-    <ds:schemaRef ds:uri="http://schemas.microsoft.com/sharepoint/v3/contenttype/forms"/>
-  </ds:schemaRefs>
-</ds:datastoreItem>
+<file path=customXml/item4.xml><?xml version="1.0" encoding="utf-8"?>
+<?mso-contentType ?>
+<FormTemplates xmlns="http://schemas.microsoft.com/sharepoint/v3/contenttype/forms">
+  <Display>DocumentLibraryForm</Display>
+  <Edit>DocumentLibraryForm</Edit>
+  <New>DocumentLibraryForm</New>
+</FormTemplates>
 </file>
 
-<file path=customXml/itemProps3.xml><?xml version="1.0" encoding="utf-8"?>
+<file path=customXml/itemProps1.xml><?xml version="1.0" encoding="utf-8"?>
 <ds:datastoreItem xmlns:ds="http://schemas.openxmlformats.org/officeDocument/2006/customXml" ds:itemID="{6921749B-AEB7-461B-845F-603CABD25259}">
   <ds:schemaRefs>
     <ds:schemaRef ds:uri="7bb5d761-a2ea-4873-95f7-7a6658fb3ef0"/>
@@ -16672,7 +16694,7 @@
 </ds:datastoreItem>
 </file>
 
-<file path=customXml/itemProps4.xml><?xml version="1.0" encoding="utf-8"?>
+<file path=customXml/itemProps2.xml><?xml version="1.0" encoding="utf-8"?>
 <ds:datastoreItem xmlns:ds="http://schemas.openxmlformats.org/officeDocument/2006/customXml" ds:itemID="{164479E5-0B02-49AC-B79E-EC1D6164DDD3}">
   <ds:schemaRefs>
     <ds:schemaRef ds:uri="http://schemas.microsoft.com/office/2006/metadata/contentType"/>
@@ -16688,4 +16710,20 @@
     <ds:schemaRef ds:uri="http://schemas.microsoft.com/internal/obd"/>
   </ds:schemaRefs>
 </ds:datastoreItem>
+</file>
+
+<file path=customXml/itemProps3.xml><?xml version="1.0" encoding="utf-8"?>
+<ds:datastoreItem xmlns:ds="http://schemas.openxmlformats.org/officeDocument/2006/customXml" ds:itemID="{B13EBC30-FE27-4C6A-B723-23FC2188F7DC}">
+  <ds:schemaRefs>
+    <ds:schemaRef ds:uri="http://schemas.microsoft.com/sharepoint/events"/>
+  </ds:schemaRefs>
+</ds:datastoreItem>
+</file>
+
+<file path=customXml/itemProps4.xml><?xml version="1.0" encoding="utf-8"?>
+<ds:datastoreItem xmlns:ds="http://schemas.openxmlformats.org/officeDocument/2006/customXml" ds:itemID="{5CDEB364-43EC-4510-9881-539C2A3FCE9E}">
+  <ds:schemaRefs>
+    <ds:schemaRef ds:uri="http://schemas.microsoft.com/sharepoint/v3/contenttype/forms"/>
+  </ds:schemaRefs>
+</ds:datastoreItem>
 </file>
</xml_diff>